<commit_message>
Scala spark and java
</commit_message>
<xml_diff>
--- a/MultiThreading.pptx
+++ b/MultiThreading.pptx
@@ -325,7 +325,7 @@
           <a:p>
             <a:fld id="{8F235549-BF0A-4B98-8561-3786244E808C}" type="datetimeFigureOut">
               <a:rPr lang="en-US" smtClean="0"/>
-              <a:t>3/16/2016</a:t>
+              <a:t>3/17/2016</a:t>
             </a:fld>
             <a:endParaRPr lang="en-US"/>
           </a:p>
@@ -525,7 +525,7 @@
           <a:p>
             <a:fld id="{8F235549-BF0A-4B98-8561-3786244E808C}" type="datetimeFigureOut">
               <a:rPr lang="en-US" smtClean="0"/>
-              <a:t>3/16/2016</a:t>
+              <a:t>3/17/2016</a:t>
             </a:fld>
             <a:endParaRPr lang="en-US"/>
           </a:p>
@@ -700,7 +700,7 @@
           <a:p>
             <a:fld id="{8F235549-BF0A-4B98-8561-3786244E808C}" type="datetimeFigureOut">
               <a:rPr lang="en-US" smtClean="0"/>
-              <a:t>3/16/2016</a:t>
+              <a:t>3/17/2016</a:t>
             </a:fld>
             <a:endParaRPr lang="en-US"/>
           </a:p>
@@ -865,7 +865,7 @@
           <a:p>
             <a:fld id="{8F235549-BF0A-4B98-8561-3786244E808C}" type="datetimeFigureOut">
               <a:rPr lang="en-US" smtClean="0"/>
-              <a:t>3/16/2016</a:t>
+              <a:t>3/17/2016</a:t>
             </a:fld>
             <a:endParaRPr lang="en-US"/>
           </a:p>
@@ -1113,7 +1113,7 @@
           <a:p>
             <a:fld id="{8F235549-BF0A-4B98-8561-3786244E808C}" type="datetimeFigureOut">
               <a:rPr lang="en-US" smtClean="0"/>
-              <a:t>3/16/2016</a:t>
+              <a:t>3/17/2016</a:t>
             </a:fld>
             <a:endParaRPr lang="en-US"/>
           </a:p>
@@ -1431,7 +1431,7 @@
           <a:p>
             <a:fld id="{8F235549-BF0A-4B98-8561-3786244E808C}" type="datetimeFigureOut">
               <a:rPr lang="en-US" smtClean="0"/>
-              <a:t>3/16/2016</a:t>
+              <a:t>3/17/2016</a:t>
             </a:fld>
             <a:endParaRPr lang="en-US"/>
           </a:p>
@@ -1897,7 +1897,7 @@
           <a:p>
             <a:fld id="{8F235549-BF0A-4B98-8561-3786244E808C}" type="datetimeFigureOut">
               <a:rPr lang="en-US" smtClean="0"/>
-              <a:t>3/16/2016</a:t>
+              <a:t>3/17/2016</a:t>
             </a:fld>
             <a:endParaRPr lang="en-US"/>
           </a:p>
@@ -2045,7 +2045,7 @@
           <a:p>
             <a:fld id="{8F235549-BF0A-4B98-8561-3786244E808C}" type="datetimeFigureOut">
               <a:rPr lang="en-US" smtClean="0"/>
-              <a:t>3/16/2016</a:t>
+              <a:t>3/17/2016</a:t>
             </a:fld>
             <a:endParaRPr lang="en-US"/>
           </a:p>
@@ -2135,7 +2135,7 @@
           <a:p>
             <a:fld id="{8F235549-BF0A-4B98-8561-3786244E808C}" type="datetimeFigureOut">
               <a:rPr lang="en-US" smtClean="0"/>
-              <a:t>3/16/2016</a:t>
+              <a:t>3/17/2016</a:t>
             </a:fld>
             <a:endParaRPr lang="en-US"/>
           </a:p>
@@ -2409,7 +2409,7 @@
           <a:p>
             <a:fld id="{8F235549-BF0A-4B98-8561-3786244E808C}" type="datetimeFigureOut">
               <a:rPr lang="en-US" smtClean="0"/>
-              <a:t>3/16/2016</a:t>
+              <a:t>3/17/2016</a:t>
             </a:fld>
             <a:endParaRPr lang="en-US"/>
           </a:p>
@@ -2714,7 +2714,7 @@
           <a:p>
             <a:fld id="{8F235549-BF0A-4B98-8561-3786244E808C}" type="datetimeFigureOut">
               <a:rPr lang="en-US" smtClean="0"/>
-              <a:t>3/16/2016</a:t>
+              <a:t>3/17/2016</a:t>
             </a:fld>
             <a:endParaRPr lang="en-US"/>
           </a:p>
@@ -3012,7 +3012,7 @@
           <a:p>
             <a:fld id="{8F235549-BF0A-4B98-8561-3786244E808C}" type="datetimeFigureOut">
               <a:rPr lang="en-US" smtClean="0"/>
-              <a:t>3/16/2016</a:t>
+              <a:t>3/17/2016</a:t>
             </a:fld>
             <a:endParaRPr lang="en-US"/>
           </a:p>
@@ -9076,13 +9076,8 @@
           <a:p>
             <a:r>
               <a:rPr lang="en-US" sz="1600" dirty="0" smtClean="0"/>
-              <a:t>Introduced in JDK 5 to create different types of thread </a:t>
-            </a:r>
-            <a:r>
-              <a:rPr lang="en-US" sz="1600" dirty="0" smtClean="0"/>
-              <a:t>pool</a:t>
-            </a:r>
-            <a:endParaRPr lang="en-US" sz="1600" dirty="0" smtClean="0"/>
+              <a:t>Introduced in JDK 5 to create different types of thread pool</a:t>
+            </a:r>
           </a:p>
           <a:p>
             <a:r>

</xml_diff>

<commit_message>
Future and Callable added
</commit_message>
<xml_diff>
--- a/MultiThreading.pptx
+++ b/MultiThreading.pptx
@@ -34,8 +34,10 @@
     <p:sldId id="297" r:id="rId28"/>
     <p:sldId id="303" r:id="rId29"/>
     <p:sldId id="301" r:id="rId30"/>
-    <p:sldId id="309" r:id="rId31"/>
-    <p:sldId id="269" r:id="rId32"/>
+    <p:sldId id="311" r:id="rId31"/>
+    <p:sldId id="312" r:id="rId32"/>
+    <p:sldId id="309" r:id="rId33"/>
+    <p:sldId id="269" r:id="rId34"/>
   </p:sldIdLst>
   <p:sldSz cx="9144000" cy="6858000" type="screen4x3"/>
   <p:notesSz cx="6858000" cy="9144000"/>
@@ -325,7 +327,7 @@
           <a:p>
             <a:fld id="{8F235549-BF0A-4B98-8561-3786244E808C}" type="datetimeFigureOut">
               <a:rPr lang="en-US" smtClean="0"/>
-              <a:t>4/14/2016</a:t>
+              <a:t>5/17/2017</a:t>
             </a:fld>
             <a:endParaRPr lang="en-US"/>
           </a:p>
@@ -525,7 +527,7 @@
           <a:p>
             <a:fld id="{8F235549-BF0A-4B98-8561-3786244E808C}" type="datetimeFigureOut">
               <a:rPr lang="en-US" smtClean="0"/>
-              <a:t>4/14/2016</a:t>
+              <a:t>5/17/2017</a:t>
             </a:fld>
             <a:endParaRPr lang="en-US"/>
           </a:p>
@@ -700,7 +702,7 @@
           <a:p>
             <a:fld id="{8F235549-BF0A-4B98-8561-3786244E808C}" type="datetimeFigureOut">
               <a:rPr lang="en-US" smtClean="0"/>
-              <a:t>4/14/2016</a:t>
+              <a:t>5/17/2017</a:t>
             </a:fld>
             <a:endParaRPr lang="en-US"/>
           </a:p>
@@ -865,7 +867,7 @@
           <a:p>
             <a:fld id="{8F235549-BF0A-4B98-8561-3786244E808C}" type="datetimeFigureOut">
               <a:rPr lang="en-US" smtClean="0"/>
-              <a:t>4/14/2016</a:t>
+              <a:t>5/17/2017</a:t>
             </a:fld>
             <a:endParaRPr lang="en-US"/>
           </a:p>
@@ -1113,7 +1115,7 @@
           <a:p>
             <a:fld id="{8F235549-BF0A-4B98-8561-3786244E808C}" type="datetimeFigureOut">
               <a:rPr lang="en-US" smtClean="0"/>
-              <a:t>4/14/2016</a:t>
+              <a:t>5/17/2017</a:t>
             </a:fld>
             <a:endParaRPr lang="en-US"/>
           </a:p>
@@ -1431,7 +1433,7 @@
           <a:p>
             <a:fld id="{8F235549-BF0A-4B98-8561-3786244E808C}" type="datetimeFigureOut">
               <a:rPr lang="en-US" smtClean="0"/>
-              <a:t>4/14/2016</a:t>
+              <a:t>5/17/2017</a:t>
             </a:fld>
             <a:endParaRPr lang="en-US"/>
           </a:p>
@@ -1897,7 +1899,7 @@
           <a:p>
             <a:fld id="{8F235549-BF0A-4B98-8561-3786244E808C}" type="datetimeFigureOut">
               <a:rPr lang="en-US" smtClean="0"/>
-              <a:t>4/14/2016</a:t>
+              <a:t>5/17/2017</a:t>
             </a:fld>
             <a:endParaRPr lang="en-US"/>
           </a:p>
@@ -2045,7 +2047,7 @@
           <a:p>
             <a:fld id="{8F235549-BF0A-4B98-8561-3786244E808C}" type="datetimeFigureOut">
               <a:rPr lang="en-US" smtClean="0"/>
-              <a:t>4/14/2016</a:t>
+              <a:t>5/17/2017</a:t>
             </a:fld>
             <a:endParaRPr lang="en-US"/>
           </a:p>
@@ -2135,7 +2137,7 @@
           <a:p>
             <a:fld id="{8F235549-BF0A-4B98-8561-3786244E808C}" type="datetimeFigureOut">
               <a:rPr lang="en-US" smtClean="0"/>
-              <a:t>4/14/2016</a:t>
+              <a:t>5/17/2017</a:t>
             </a:fld>
             <a:endParaRPr lang="en-US"/>
           </a:p>
@@ -2409,7 +2411,7 @@
           <a:p>
             <a:fld id="{8F235549-BF0A-4B98-8561-3786244E808C}" type="datetimeFigureOut">
               <a:rPr lang="en-US" smtClean="0"/>
-              <a:t>4/14/2016</a:t>
+              <a:t>5/17/2017</a:t>
             </a:fld>
             <a:endParaRPr lang="en-US"/>
           </a:p>
@@ -2714,7 +2716,7 @@
           <a:p>
             <a:fld id="{8F235549-BF0A-4B98-8561-3786244E808C}" type="datetimeFigureOut">
               <a:rPr lang="en-US" smtClean="0"/>
-              <a:t>4/14/2016</a:t>
+              <a:t>5/17/2017</a:t>
             </a:fld>
             <a:endParaRPr lang="en-US"/>
           </a:p>
@@ -3012,7 +3014,7 @@
           <a:p>
             <a:fld id="{8F235549-BF0A-4B98-8561-3786244E808C}" type="datetimeFigureOut">
               <a:rPr lang="en-US" smtClean="0"/>
-              <a:t>4/14/2016</a:t>
+              <a:t>5/17/2017</a:t>
             </a:fld>
             <a:endParaRPr lang="en-US"/>
           </a:p>
@@ -7088,6 +7090,431 @@
         </p:nvSpPr>
         <p:spPr/>
         <p:txBody>
+          <a:bodyPr>
+            <a:normAutofit/>
+          </a:bodyPr>
+          <a:lstStyle/>
+          <a:p>
+            <a:r>
+              <a:rPr lang="en-US" dirty="0" smtClean="0"/>
+              <a:t>Future Interface</a:t>
+            </a:r>
+            <a:endParaRPr lang="en-US" dirty="0"/>
+          </a:p>
+        </p:txBody>
+      </p:sp>
+      <p:sp>
+        <p:nvSpPr>
+          <p:cNvPr id="3" name="Content Placeholder 2"/>
+          <p:cNvSpPr>
+            <a:spLocks noGrp="1"/>
+          </p:cNvSpPr>
+          <p:nvPr>
+            <p:ph idx="1"/>
+          </p:nvPr>
+        </p:nvSpPr>
+        <p:spPr/>
+        <p:txBody>
+          <a:bodyPr>
+            <a:normAutofit/>
+          </a:bodyPr>
+          <a:lstStyle/>
+          <a:p>
+            <a:r>
+              <a:rPr lang="en-GB" sz="1600" dirty="0"/>
+              <a:t>A </a:t>
+            </a:r>
+            <a:r>
+              <a:rPr lang="en-GB" sz="1600" dirty="0"/>
+              <a:t>Future</a:t>
+            </a:r>
+            <a:r>
+              <a:rPr lang="en-GB" sz="1600" dirty="0"/>
+              <a:t> represents the result of an </a:t>
+            </a:r>
+            <a:r>
+              <a:rPr lang="en-GB" sz="1600" b="1" dirty="0"/>
+              <a:t>asynchronous computation</a:t>
+            </a:r>
+            <a:r>
+              <a:rPr lang="en-GB" sz="1600" dirty="0"/>
+              <a:t>. Methods are provided to check if the computation is complete, to wait for its completion, and to retrieve the result of the computation. </a:t>
+            </a:r>
+            <a:endParaRPr lang="en-GB" sz="1600" dirty="0" smtClean="0"/>
+          </a:p>
+          <a:p>
+            <a:r>
+              <a:rPr lang="en-GB" sz="1600" dirty="0" smtClean="0"/>
+              <a:t>The </a:t>
+            </a:r>
+            <a:r>
+              <a:rPr lang="en-GB" sz="1600" dirty="0"/>
+              <a:t>result can only be retrieved using </a:t>
+            </a:r>
+            <a:r>
+              <a:rPr lang="en-GB" sz="1600" b="1" dirty="0"/>
+              <a:t>method </a:t>
+            </a:r>
+            <a:r>
+              <a:rPr lang="en-GB" sz="1600" b="1" dirty="0"/>
+              <a:t>get</a:t>
+            </a:r>
+            <a:r>
+              <a:rPr lang="en-GB" sz="1600" b="1" dirty="0"/>
+              <a:t> </a:t>
+            </a:r>
+            <a:r>
+              <a:rPr lang="en-GB" sz="1600" dirty="0"/>
+              <a:t>when the computation has completed, blocking if necessary until it is ready. Cancellation is performed by the </a:t>
+            </a:r>
+            <a:r>
+              <a:rPr lang="en-GB" sz="1600" b="1" dirty="0"/>
+              <a:t>cancel</a:t>
+            </a:r>
+            <a:r>
+              <a:rPr lang="en-GB" sz="1600" b="1" dirty="0"/>
+              <a:t> method</a:t>
+            </a:r>
+            <a:r>
+              <a:rPr lang="en-GB" sz="1600" dirty="0"/>
+              <a:t>. Additional methods are provided to determine if the task completed normally or was cancelled. Once a computation has completed, the computation cannot be cancelled. If you would like to use a </a:t>
+            </a:r>
+            <a:r>
+              <a:rPr lang="en-GB" sz="1600" dirty="0"/>
+              <a:t>Future</a:t>
+            </a:r>
+            <a:r>
+              <a:rPr lang="en-GB" sz="1600" dirty="0"/>
+              <a:t> for the sake of cancellability but not provide a usable result, you can declare types of the form </a:t>
+            </a:r>
+            <a:r>
+              <a:rPr lang="en-GB" sz="1600" dirty="0"/>
+              <a:t>Future&lt;?&gt;</a:t>
+            </a:r>
+            <a:r>
+              <a:rPr lang="en-GB" sz="1600" dirty="0"/>
+              <a:t> </a:t>
+            </a:r>
+            <a:r>
+              <a:rPr lang="en-GB" sz="1600" dirty="0" smtClean="0"/>
+              <a:t>and </a:t>
+            </a:r>
+            <a:r>
+              <a:rPr lang="en-GB" sz="1600" dirty="0"/>
+              <a:t>return </a:t>
+            </a:r>
+            <a:r>
+              <a:rPr lang="en-GB" sz="1600" dirty="0"/>
+              <a:t>null</a:t>
+            </a:r>
+            <a:r>
+              <a:rPr lang="en-GB" sz="1600" dirty="0"/>
+              <a:t> as a result of the underlying task</a:t>
+            </a:r>
+            <a:r>
+              <a:rPr lang="en-GB" sz="1600" dirty="0" smtClean="0"/>
+              <a:t>.</a:t>
+            </a:r>
+          </a:p>
+          <a:p>
+            <a:r>
+              <a:rPr lang="en-GB" sz="1600" dirty="0" smtClean="0"/>
+              <a:t>Sub interfaces:-</a:t>
+            </a:r>
+          </a:p>
+          <a:p>
+            <a:pPr lvl="1"/>
+            <a:r>
+              <a:rPr lang="en-GB" sz="1400" dirty="0" smtClean="0"/>
+              <a:t>Response&lt;T&gt;</a:t>
+            </a:r>
+          </a:p>
+          <a:p>
+            <a:pPr lvl="1"/>
+            <a:r>
+              <a:rPr lang="en-GB" sz="1400" dirty="0" err="1" smtClean="0"/>
+              <a:t>RunnableFuture</a:t>
+            </a:r>
+            <a:r>
+              <a:rPr lang="en-GB" sz="1400" dirty="0" smtClean="0"/>
+              <a:t>&lt;V&gt;</a:t>
+            </a:r>
+          </a:p>
+          <a:p>
+            <a:pPr lvl="1"/>
+            <a:r>
+              <a:rPr lang="en-GB" sz="1400" dirty="0" err="1"/>
+              <a:t>RunnableScheduledFuture</a:t>
+            </a:r>
+            <a:r>
+              <a:rPr lang="en-GB" sz="1400" dirty="0"/>
+              <a:t>&lt;V</a:t>
+            </a:r>
+            <a:r>
+              <a:rPr lang="en-GB" sz="1400" dirty="0" smtClean="0"/>
+              <a:t>&gt;</a:t>
+            </a:r>
+          </a:p>
+          <a:p>
+            <a:pPr lvl="1"/>
+            <a:r>
+              <a:rPr lang="en-GB" sz="1400" dirty="0"/>
+              <a:t> </a:t>
+            </a:r>
+            <a:r>
+              <a:rPr lang="en-GB" sz="1400" dirty="0" err="1"/>
+              <a:t>ScheduledFuture</a:t>
+            </a:r>
+            <a:r>
+              <a:rPr lang="en-GB" sz="1400" dirty="0"/>
+              <a:t>&lt;V&gt;</a:t>
+            </a:r>
+            <a:endParaRPr lang="en-GB" sz="1400" dirty="0" smtClean="0"/>
+          </a:p>
+          <a:p>
+            <a:pPr lvl="1"/>
+            <a:endParaRPr lang="en-US" sz="1200" dirty="0"/>
+          </a:p>
+        </p:txBody>
+      </p:sp>
+    </p:spTree>
+    <p:extLst>
+      <p:ext uri="{BB962C8B-B14F-4D97-AF65-F5344CB8AC3E}">
+        <p14:creationId xmlns:p14="http://schemas.microsoft.com/office/powerpoint/2010/main" val="524333974"/>
+      </p:ext>
+    </p:extLst>
+  </p:cSld>
+  <p:clrMapOvr>
+    <a:masterClrMapping/>
+  </p:clrMapOvr>
+  <p:timing>
+    <p:tnLst>
+      <p:par>
+        <p:cTn id="1" dur="indefinite" restart="never" nodeType="tmRoot"/>
+      </p:par>
+    </p:tnLst>
+  </p:timing>
+</p:sld>
+</file>
+
+<file path=ppt/slides/slide31.xml><?xml version="1.0" encoding="utf-8"?>
+<p:sld xmlns:a="http://schemas.openxmlformats.org/drawingml/2006/main" xmlns:r="http://schemas.openxmlformats.org/officeDocument/2006/relationships" xmlns:p="http://schemas.openxmlformats.org/presentationml/2006/main">
+  <p:cSld>
+    <p:spTree>
+      <p:nvGrpSpPr>
+        <p:cNvPr id="1" name=""/>
+        <p:cNvGrpSpPr/>
+        <p:nvPr/>
+      </p:nvGrpSpPr>
+      <p:grpSpPr>
+        <a:xfrm>
+          <a:off x="0" y="0"/>
+          <a:ext cx="0" cy="0"/>
+          <a:chOff x="0" y="0"/>
+          <a:chExt cx="0" cy="0"/>
+        </a:xfrm>
+      </p:grpSpPr>
+      <p:sp>
+        <p:nvSpPr>
+          <p:cNvPr id="2" name="Title 1"/>
+          <p:cNvSpPr>
+            <a:spLocks noGrp="1"/>
+          </p:cNvSpPr>
+          <p:nvPr>
+            <p:ph type="title"/>
+          </p:nvPr>
+        </p:nvSpPr>
+        <p:spPr/>
+        <p:txBody>
+          <a:bodyPr>
+            <a:normAutofit/>
+          </a:bodyPr>
+          <a:lstStyle/>
+          <a:p>
+            <a:r>
+              <a:rPr lang="en-US" dirty="0" smtClean="0"/>
+              <a:t>Callable – Functional Interface</a:t>
+            </a:r>
+            <a:endParaRPr lang="en-US" dirty="0"/>
+          </a:p>
+        </p:txBody>
+      </p:sp>
+      <p:sp>
+        <p:nvSpPr>
+          <p:cNvPr id="3" name="Content Placeholder 2"/>
+          <p:cNvSpPr>
+            <a:spLocks noGrp="1"/>
+          </p:cNvSpPr>
+          <p:nvPr>
+            <p:ph idx="1"/>
+          </p:nvPr>
+        </p:nvSpPr>
+        <p:spPr/>
+        <p:txBody>
+          <a:bodyPr>
+            <a:normAutofit/>
+          </a:bodyPr>
+          <a:lstStyle/>
+          <a:p>
+            <a:r>
+              <a:rPr lang="en-GB" sz="1600" dirty="0"/>
+              <a:t>This is a functional interface and can therefore be used as the assignment target for a lambda expression or method </a:t>
+            </a:r>
+            <a:r>
+              <a:rPr lang="en-GB" sz="1600" dirty="0" smtClean="0"/>
+              <a:t>reference</a:t>
+            </a:r>
+          </a:p>
+          <a:p>
+            <a:r>
+              <a:rPr lang="en-GB" sz="1600" dirty="0"/>
+              <a:t>A task that returns a result and may throw an exception. </a:t>
+            </a:r>
+            <a:r>
+              <a:rPr lang="en-GB" sz="1600" dirty="0" err="1"/>
+              <a:t>Implementors</a:t>
+            </a:r>
+            <a:r>
+              <a:rPr lang="en-GB" sz="1600" dirty="0"/>
+              <a:t> define a single method with no arguments called </a:t>
+            </a:r>
+            <a:r>
+              <a:rPr lang="en-GB" sz="1600" b="1" dirty="0"/>
+              <a:t>call</a:t>
+            </a:r>
+            <a:r>
+              <a:rPr lang="en-GB" sz="1600" dirty="0" smtClean="0"/>
+              <a:t>.</a:t>
+            </a:r>
+          </a:p>
+          <a:p>
+            <a:r>
+              <a:rPr lang="en-GB" sz="1600" dirty="0"/>
+              <a:t>The </a:t>
+            </a:r>
+            <a:r>
+              <a:rPr lang="en-GB" sz="1600" dirty="0"/>
+              <a:t>Callable</a:t>
+            </a:r>
+            <a:r>
+              <a:rPr lang="en-GB" sz="1600" dirty="0"/>
+              <a:t> interface is similar to </a:t>
+            </a:r>
+            <a:r>
+              <a:rPr lang="en-GB" sz="1600" dirty="0">
+                <a:hlinkClick r:id="rId2" tooltip="interface in java.lang"/>
+              </a:rPr>
+              <a:t>Runnable</a:t>
+            </a:r>
+            <a:r>
+              <a:rPr lang="en-GB" sz="1600" dirty="0"/>
+              <a:t>, in that both are designed for classes whose instances are potentially executed by another thread. </a:t>
+            </a:r>
+            <a:r>
+              <a:rPr lang="en-GB" sz="1600" dirty="0">
+                <a:solidFill>
+                  <a:srgbClr val="FF0000"/>
+                </a:solidFill>
+              </a:rPr>
+              <a:t>A </a:t>
+            </a:r>
+            <a:r>
+              <a:rPr lang="en-GB" sz="1600" dirty="0">
+                <a:solidFill>
+                  <a:srgbClr val="FF0000"/>
+                </a:solidFill>
+              </a:rPr>
+              <a:t>Runnable</a:t>
+            </a:r>
+            <a:r>
+              <a:rPr lang="en-GB" sz="1600" dirty="0">
+                <a:solidFill>
+                  <a:srgbClr val="FF0000"/>
+                </a:solidFill>
+              </a:rPr>
+              <a:t>, however, does not return a result and cannot throw a checked exception</a:t>
+            </a:r>
+            <a:r>
+              <a:rPr lang="en-GB" sz="1600" dirty="0" smtClean="0"/>
+              <a:t>.</a:t>
+            </a:r>
+          </a:p>
+          <a:p>
+            <a:r>
+              <a:rPr lang="en-GB" sz="1600" dirty="0"/>
+              <a:t>The </a:t>
+            </a:r>
+            <a:r>
+              <a:rPr lang="en-GB" sz="1600" dirty="0">
+                <a:hlinkClick r:id="rId3" tooltip="class in java.util.concurrent"/>
+              </a:rPr>
+              <a:t>Executors</a:t>
+            </a:r>
+            <a:r>
+              <a:rPr lang="en-GB" sz="1600" dirty="0"/>
+              <a:t> class contains utility methods to convert from other common forms to </a:t>
+            </a:r>
+            <a:r>
+              <a:rPr lang="en-GB" sz="1600" dirty="0"/>
+              <a:t>Callable</a:t>
+            </a:r>
+            <a:r>
+              <a:rPr lang="en-GB" sz="1600" dirty="0"/>
+              <a:t> classes.</a:t>
+            </a:r>
+            <a:endParaRPr lang="en-US" sz="1600" dirty="0"/>
+          </a:p>
+        </p:txBody>
+      </p:sp>
+    </p:spTree>
+    <p:extLst>
+      <p:ext uri="{BB962C8B-B14F-4D97-AF65-F5344CB8AC3E}">
+        <p14:creationId xmlns:p14="http://schemas.microsoft.com/office/powerpoint/2010/main" val="4097504239"/>
+      </p:ext>
+    </p:extLst>
+  </p:cSld>
+  <p:clrMapOvr>
+    <a:masterClrMapping/>
+  </p:clrMapOvr>
+  <p:timing>
+    <p:tnLst>
+      <p:par>
+        <p:cTn id="1" dur="indefinite" restart="never" nodeType="tmRoot"/>
+      </p:par>
+    </p:tnLst>
+  </p:timing>
+</p:sld>
+</file>
+
+<file path=ppt/slides/slide32.xml><?xml version="1.0" encoding="utf-8"?>
+<p:sld xmlns:a="http://schemas.openxmlformats.org/drawingml/2006/main" xmlns:r="http://schemas.openxmlformats.org/officeDocument/2006/relationships" xmlns:p="http://schemas.openxmlformats.org/presentationml/2006/main">
+  <p:cSld>
+    <p:spTree>
+      <p:nvGrpSpPr>
+        <p:cNvPr id="1" name=""/>
+        <p:cNvGrpSpPr/>
+        <p:nvPr/>
+      </p:nvGrpSpPr>
+      <p:grpSpPr>
+        <a:xfrm>
+          <a:off x="0" y="0"/>
+          <a:ext cx="0" cy="0"/>
+          <a:chOff x="0" y="0"/>
+          <a:chExt cx="0" cy="0"/>
+        </a:xfrm>
+      </p:grpSpPr>
+      <p:sp>
+        <p:nvSpPr>
+          <p:cNvPr id="2" name="Title 1"/>
+          <p:cNvSpPr>
+            <a:spLocks noGrp="1"/>
+          </p:cNvSpPr>
+          <p:nvPr>
+            <p:ph type="title"/>
+          </p:nvPr>
+        </p:nvSpPr>
+        <p:spPr/>
+        <p:txBody>
           <a:bodyPr/>
           <a:lstStyle/>
           <a:p>
@@ -7171,7 +7598,7 @@
 </p:sld>
 </file>
 
-<file path=ppt/slides/slide31.xml><?xml version="1.0" encoding="utf-8"?>
+<file path=ppt/slides/slide33.xml><?xml version="1.0" encoding="utf-8"?>
 <p:sld xmlns:a="http://schemas.openxmlformats.org/drawingml/2006/main" xmlns:r="http://schemas.openxmlformats.org/officeDocument/2006/relationships" xmlns:p="http://schemas.openxmlformats.org/presentationml/2006/main">
   <p:cSld>
     <p:spTree>

</xml_diff>

<commit_message>
Runnable interface over Thread class
</commit_message>
<xml_diff>
--- a/MultiThreading.pptx
+++ b/MultiThreading.pptx
@@ -33,23 +33,26 @@
     <p:sldId id="289" r:id="rId27"/>
     <p:sldId id="290" r:id="rId28"/>
     <p:sldId id="291" r:id="rId29"/>
-    <p:sldId id="292" r:id="rId30"/>
-    <p:sldId id="293" r:id="rId31"/>
-    <p:sldId id="294" r:id="rId32"/>
-    <p:sldId id="295" r:id="rId33"/>
-    <p:sldId id="296" r:id="rId34"/>
-    <p:sldId id="298" r:id="rId35"/>
-    <p:sldId id="302" r:id="rId36"/>
-    <p:sldId id="299" r:id="rId37"/>
-    <p:sldId id="300" r:id="rId38"/>
-    <p:sldId id="297" r:id="rId39"/>
-    <p:sldId id="303" r:id="rId40"/>
-    <p:sldId id="301" r:id="rId41"/>
-    <p:sldId id="311" r:id="rId42"/>
-    <p:sldId id="312" r:id="rId43"/>
-    <p:sldId id="324" r:id="rId44"/>
-    <p:sldId id="309" r:id="rId45"/>
-    <p:sldId id="269" r:id="rId46"/>
+    <p:sldId id="325" r:id="rId30"/>
+    <p:sldId id="292" r:id="rId31"/>
+    <p:sldId id="293" r:id="rId32"/>
+    <p:sldId id="294" r:id="rId33"/>
+    <p:sldId id="295" r:id="rId34"/>
+    <p:sldId id="296" r:id="rId35"/>
+    <p:sldId id="298" r:id="rId36"/>
+    <p:sldId id="302" r:id="rId37"/>
+    <p:sldId id="327" r:id="rId38"/>
+    <p:sldId id="299" r:id="rId39"/>
+    <p:sldId id="300" r:id="rId40"/>
+    <p:sldId id="297" r:id="rId41"/>
+    <p:sldId id="303" r:id="rId42"/>
+    <p:sldId id="301" r:id="rId43"/>
+    <p:sldId id="311" r:id="rId44"/>
+    <p:sldId id="312" r:id="rId45"/>
+    <p:sldId id="324" r:id="rId46"/>
+    <p:sldId id="326" r:id="rId47"/>
+    <p:sldId id="309" r:id="rId48"/>
+    <p:sldId id="269" r:id="rId49"/>
   </p:sldIdLst>
   <p:sldSz cx="9144000" cy="6858000" type="screen4x3"/>
   <p:notesSz cx="6858000" cy="9144000"/>
@@ -339,7 +342,7 @@
           <a:p>
             <a:fld id="{8F235549-BF0A-4B98-8561-3786244E808C}" type="datetimeFigureOut">
               <a:rPr lang="en-US" smtClean="0"/>
-              <a:t>2/4/2018</a:t>
+              <a:t>3/4/2018</a:t>
             </a:fld>
             <a:endParaRPr lang="en-US"/>
           </a:p>
@@ -539,7 +542,7 @@
           <a:p>
             <a:fld id="{8F235549-BF0A-4B98-8561-3786244E808C}" type="datetimeFigureOut">
               <a:rPr lang="en-US" smtClean="0"/>
-              <a:t>2/4/2018</a:t>
+              <a:t>3/4/2018</a:t>
             </a:fld>
             <a:endParaRPr lang="en-US"/>
           </a:p>
@@ -714,7 +717,7 @@
           <a:p>
             <a:fld id="{8F235549-BF0A-4B98-8561-3786244E808C}" type="datetimeFigureOut">
               <a:rPr lang="en-US" smtClean="0"/>
-              <a:t>2/4/2018</a:t>
+              <a:t>3/4/2018</a:t>
             </a:fld>
             <a:endParaRPr lang="en-US"/>
           </a:p>
@@ -879,7 +882,7 @@
           <a:p>
             <a:fld id="{8F235549-BF0A-4B98-8561-3786244E808C}" type="datetimeFigureOut">
               <a:rPr lang="en-US" smtClean="0"/>
-              <a:t>2/4/2018</a:t>
+              <a:t>3/4/2018</a:t>
             </a:fld>
             <a:endParaRPr lang="en-US"/>
           </a:p>
@@ -1127,7 +1130,7 @@
           <a:p>
             <a:fld id="{8F235549-BF0A-4B98-8561-3786244E808C}" type="datetimeFigureOut">
               <a:rPr lang="en-US" smtClean="0"/>
-              <a:t>2/4/2018</a:t>
+              <a:t>3/4/2018</a:t>
             </a:fld>
             <a:endParaRPr lang="en-US"/>
           </a:p>
@@ -1445,7 +1448,7 @@
           <a:p>
             <a:fld id="{8F235549-BF0A-4B98-8561-3786244E808C}" type="datetimeFigureOut">
               <a:rPr lang="en-US" smtClean="0"/>
-              <a:t>2/4/2018</a:t>
+              <a:t>3/4/2018</a:t>
             </a:fld>
             <a:endParaRPr lang="en-US"/>
           </a:p>
@@ -1911,7 +1914,7 @@
           <a:p>
             <a:fld id="{8F235549-BF0A-4B98-8561-3786244E808C}" type="datetimeFigureOut">
               <a:rPr lang="en-US" smtClean="0"/>
-              <a:t>2/4/2018</a:t>
+              <a:t>3/4/2018</a:t>
             </a:fld>
             <a:endParaRPr lang="en-US"/>
           </a:p>
@@ -2059,7 +2062,7 @@
           <a:p>
             <a:fld id="{8F235549-BF0A-4B98-8561-3786244E808C}" type="datetimeFigureOut">
               <a:rPr lang="en-US" smtClean="0"/>
-              <a:t>2/4/2018</a:t>
+              <a:t>3/4/2018</a:t>
             </a:fld>
             <a:endParaRPr lang="en-US"/>
           </a:p>
@@ -2149,7 +2152,7 @@
           <a:p>
             <a:fld id="{8F235549-BF0A-4B98-8561-3786244E808C}" type="datetimeFigureOut">
               <a:rPr lang="en-US" smtClean="0"/>
-              <a:t>2/4/2018</a:t>
+              <a:t>3/4/2018</a:t>
             </a:fld>
             <a:endParaRPr lang="en-US"/>
           </a:p>
@@ -2423,7 +2426,7 @@
           <a:p>
             <a:fld id="{8F235549-BF0A-4B98-8561-3786244E808C}" type="datetimeFigureOut">
               <a:rPr lang="en-US" smtClean="0"/>
-              <a:t>2/4/2018</a:t>
+              <a:t>3/4/2018</a:t>
             </a:fld>
             <a:endParaRPr lang="en-US"/>
           </a:p>
@@ -2728,7 +2731,7 @@
           <a:p>
             <a:fld id="{8F235549-BF0A-4B98-8561-3786244E808C}" type="datetimeFigureOut">
               <a:rPr lang="en-US" smtClean="0"/>
-              <a:t>2/4/2018</a:t>
+              <a:t>3/4/2018</a:t>
             </a:fld>
             <a:endParaRPr lang="en-US"/>
           </a:p>
@@ -3026,7 +3029,7 @@
           <a:p>
             <a:fld id="{8F235549-BF0A-4B98-8561-3786244E808C}" type="datetimeFigureOut">
               <a:rPr lang="en-US" smtClean="0"/>
-              <a:t>2/4/2018</a:t>
+              <a:t>3/4/2018</a:t>
             </a:fld>
             <a:endParaRPr lang="en-US"/>
           </a:p>
@@ -6650,7 +6653,19 @@
           <a:p>
             <a:r>
               <a:rPr lang="en-GB" sz="1600" dirty="0" smtClean="0"/>
-              <a:t>Alternative to HashTable, introduced in Java 5</a:t>
+              <a:t>Alternative to </a:t>
+            </a:r>
+            <a:r>
+              <a:rPr lang="en-GB" sz="1600" b="1" dirty="0" smtClean="0">
+                <a:solidFill>
+                  <a:srgbClr val="FF0000"/>
+                </a:solidFill>
+              </a:rPr>
+              <a:t>HashTable</a:t>
+            </a:r>
+            <a:r>
+              <a:rPr lang="en-GB" sz="1600" dirty="0" smtClean="0"/>
+              <a:t>, introduced in Java 5</a:t>
             </a:r>
           </a:p>
           <a:p>
@@ -6709,7 +6724,15 @@
           <a:p>
             <a:r>
               <a:rPr lang="en-US" sz="1600" dirty="0" smtClean="0"/>
-              <a:t>Iterator returned by ConcurrentHashMap is weekly consistent, fail safe and never throw ConcurrentModificationException </a:t>
+              <a:t>Iterator returned by ConcurrentHashMap is weekly consistent, fail safe and </a:t>
+            </a:r>
+            <a:r>
+              <a:rPr lang="en-US" sz="1600" dirty="0" smtClean="0">
+                <a:solidFill>
+                  <a:srgbClr val="FF0000"/>
+                </a:solidFill>
+              </a:rPr>
+              <a:t>never throw ConcurrentModificationException </a:t>
             </a:r>
             <a:r>
               <a:rPr lang="en-GB" sz="1600" dirty="0"/>
@@ -6779,7 +6802,7 @@
           <a:p>
             <a:r>
               <a:rPr lang="en-US" dirty="0" smtClean="0"/>
-              <a:t>Heap Vs Stack</a:t>
+              <a:t>ConcurrentHashMap Vs HashTable</a:t>
             </a:r>
             <a:endParaRPr lang="en-US" dirty="0"/>
           </a:p>
@@ -6803,150 +6826,87 @@
           <a:lstStyle/>
           <a:p>
             <a:r>
-              <a:rPr lang="en-US" sz="1600" dirty="0" smtClean="0"/>
-              <a:t>Heap – Main memory, shared across all threads</a:t>
-            </a:r>
-          </a:p>
-          <a:p>
-            <a:r>
-              <a:rPr lang="en-US" sz="1600" dirty="0" smtClean="0"/>
-              <a:t>Stack – Thread memory, specific to thread</a:t>
-            </a:r>
-          </a:p>
-          <a:p>
-            <a:r>
-              <a:rPr lang="en-US" sz="1600" dirty="0" smtClean="0"/>
-              <a:t>-Xss parameter – used to control stack size of Thread</a:t>
-            </a:r>
-          </a:p>
-          <a:p>
-            <a:r>
-              <a:rPr lang="en-GB" sz="1600" dirty="0"/>
-              <a:t>-</a:t>
-            </a:r>
-            <a:r>
-              <a:rPr lang="en-GB" sz="1600" dirty="0" err="1"/>
-              <a:t>Xms</a:t>
-            </a:r>
-            <a:r>
-              <a:rPr lang="en-GB" sz="1600" dirty="0"/>
-              <a:t>&lt;size&gt; - Set initial Java heap </a:t>
+              <a:rPr lang="en-GB" sz="1600" dirty="0"/>
+              <a:t>ConcurrentHashMap is introduced in Java 1.5. ConcurrentHashMap uses </a:t>
+            </a:r>
+            <a:r>
+              <a:rPr lang="en-GB" sz="1600" dirty="0">
+                <a:solidFill>
+                  <a:srgbClr val="FF0000"/>
+                </a:solidFill>
+              </a:rPr>
+              <a:t>multiple buckets to store data</a:t>
+            </a:r>
+            <a:r>
+              <a:rPr lang="en-GB" sz="1600" dirty="0"/>
+              <a:t>. This avoids read locks and greatly improves performance over a HashTable. Both are thread safe, but there are obvious performance wins with ConcurrentHashMap</a:t>
             </a:r>
             <a:r>
               <a:rPr lang="en-GB" sz="1600" dirty="0" smtClean="0"/>
-              <a:t>size</a:t>
-            </a:r>
-          </a:p>
-          <a:p>
-            <a:r>
-              <a:rPr lang="en-GB" sz="1600" dirty="0"/>
-              <a:t>-Xmx&lt;size&gt; - Set maximum Java heap </a:t>
+              <a:t>.</a:t>
+            </a:r>
+            <a:endParaRPr lang="en-GB" sz="1600" dirty="0"/>
+          </a:p>
+          <a:p>
+            <a:r>
+              <a:rPr lang="en-GB" sz="1600" dirty="0"/>
+              <a:t>When you read from a ConcurrentHashMap using </a:t>
+            </a:r>
+            <a:r>
+              <a:rPr lang="en-GB" sz="1600" dirty="0">
+                <a:solidFill>
+                  <a:srgbClr val="FF0000"/>
+                </a:solidFill>
+              </a:rPr>
+              <a:t>get(), there are no locks</a:t>
+            </a:r>
+            <a:r>
+              <a:rPr lang="en-GB" sz="1600" dirty="0"/>
+              <a:t>, contrary to the HashTable for which all operations are simply synchronized. HashTable was released in old versions of Java whereas ConcurrentHashMap is a java 1.5 </a:t>
             </a:r>
             <a:r>
               <a:rPr lang="en-GB" sz="1600" dirty="0" smtClean="0"/>
-              <a:t>size</a:t>
-            </a:r>
-          </a:p>
-          <a:p>
-            <a:r>
-              <a:rPr lang="en-GB" sz="1600" dirty="0"/>
-              <a:t>-XX:PermSize&lt;size&gt; - Set initial PermGen </a:t>
-            </a:r>
-            <a:r>
-              <a:rPr lang="en-GB" sz="1600" dirty="0" smtClean="0"/>
-              <a:t>size </a:t>
-            </a:r>
-          </a:p>
-          <a:p>
-            <a:r>
-              <a:rPr lang="en-GB" sz="1600" dirty="0" smtClean="0"/>
-              <a:t>-</a:t>
-            </a:r>
-            <a:r>
-              <a:rPr lang="en-GB" sz="1600" dirty="0"/>
-              <a:t>XX:MaxPermSize&lt;size&gt; - Set the maximum PermGen </a:t>
-            </a:r>
-            <a:r>
-              <a:rPr lang="en-GB" sz="1600" dirty="0" smtClean="0"/>
-              <a:t>size</a:t>
-            </a:r>
-          </a:p>
-          <a:p>
-            <a:r>
-              <a:rPr lang="en-GB" sz="1600" dirty="0" smtClean="0"/>
-              <a:t>Thread Dump:</a:t>
-            </a:r>
-          </a:p>
-          <a:p>
-            <a:pPr lvl="1">
-              <a:buFont typeface="Wingdings" panose="05000000000000000000" pitchFamily="2" charset="2"/>
-              <a:buChar char="Ø"/>
-            </a:pPr>
-            <a:r>
-              <a:rPr lang="en-GB" sz="1400" dirty="0" smtClean="0"/>
-              <a:t>kill -3 command </a:t>
-            </a:r>
-            <a:r>
-              <a:rPr lang="en-GB" sz="1400" dirty="0" smtClean="0">
-                <a:sym typeface="Wingdings" panose="05000000000000000000" pitchFamily="2" charset="2"/>
+              <a:t>thing</a:t>
+            </a:r>
+            <a:endParaRPr lang="en-GB" sz="1600" dirty="0"/>
+          </a:p>
+          <a:p>
+            <a:r>
+              <a:rPr lang="en-GB" sz="1600" dirty="0">
+                <a:solidFill>
+                  <a:srgbClr val="FF0000"/>
+                </a:solidFill>
               </a:rPr>
-              <a:t> </a:t>
-            </a:r>
-          </a:p>
-          <a:p>
-            <a:pPr lvl="1">
-              <a:buFont typeface="Wingdings" panose="05000000000000000000" pitchFamily="2" charset="2"/>
-              <a:buChar char="Ø"/>
-            </a:pPr>
-            <a:r>
-              <a:rPr lang="en-GB" sz="1400" dirty="0" smtClean="0">
-                <a:sym typeface="Wingdings" panose="05000000000000000000" pitchFamily="2" charset="2"/>
+              <a:t>HashMap</a:t>
+            </a:r>
+            <a:r>
+              <a:rPr lang="en-GB" sz="1600" dirty="0"/>
+              <a:t> is the best thing to use in a </a:t>
+            </a:r>
+            <a:r>
+              <a:rPr lang="en-GB" sz="1600" dirty="0">
+                <a:solidFill>
+                  <a:srgbClr val="FF0000"/>
+                </a:solidFill>
               </a:rPr>
-              <a:t>Ctrl + Break </a:t>
-            </a:r>
-          </a:p>
-          <a:p>
-            <a:pPr lvl="1">
-              <a:buFont typeface="Wingdings" panose="05000000000000000000" pitchFamily="2" charset="2"/>
-              <a:buChar char="Ø"/>
-            </a:pPr>
-            <a:r>
-              <a:rPr lang="en-GB" sz="1400" dirty="0" smtClean="0">
-                <a:sym typeface="Wingdings" panose="05000000000000000000" pitchFamily="2" charset="2"/>
+              <a:t>single threaded </a:t>
+            </a:r>
+            <a:r>
+              <a:rPr lang="en-GB" sz="1600" dirty="0" smtClean="0">
+                <a:solidFill>
+                  <a:srgbClr val="FF0000"/>
+                </a:solidFill>
               </a:rPr>
-              <a:t>jstack – to get the thread dump</a:t>
-            </a:r>
-          </a:p>
-          <a:p>
-            <a:pPr lvl="1">
-              <a:buFont typeface="Wingdings" panose="05000000000000000000" pitchFamily="2" charset="2"/>
-              <a:buChar char="Ø"/>
-            </a:pPr>
-            <a:r>
-              <a:rPr lang="en-GB" sz="1400" dirty="0" smtClean="0">
-                <a:sym typeface="Wingdings" panose="05000000000000000000" pitchFamily="2" charset="2"/>
-              </a:rPr>
-              <a:t>jps – to find the process id</a:t>
-            </a:r>
-          </a:p>
-          <a:p>
-            <a:pPr lvl="1">
-              <a:buFont typeface="Wingdings" panose="05000000000000000000" pitchFamily="2" charset="2"/>
-              <a:buChar char="Ø"/>
-            </a:pPr>
-            <a:endParaRPr lang="en-GB" sz="1400" dirty="0" smtClean="0">
-              <a:sym typeface="Wingdings" panose="05000000000000000000" pitchFamily="2" charset="2"/>
-            </a:endParaRPr>
-          </a:p>
-          <a:p>
-            <a:endParaRPr lang="en-US" sz="1600" dirty="0"/>
+              <a:t>application</a:t>
+            </a:r>
+            <a:endParaRPr lang="en-US" sz="1600" dirty="0" smtClean="0"/>
           </a:p>
         </p:txBody>
       </p:sp>
     </p:spTree>
     <p:extLst>
       <p:ext uri="{BB962C8B-B14F-4D97-AF65-F5344CB8AC3E}">
-        <p14:creationId xmlns:p14="http://schemas.microsoft.com/office/powerpoint/2010/main" val="3841733265"/>
+        <p14:creationId xmlns:p14="http://schemas.microsoft.com/office/powerpoint/2010/main" val="2520215687"/>
       </p:ext>
     </p:extLst>
   </p:cSld>
@@ -7109,8 +7069,8 @@
           <a:lstStyle/>
           <a:p>
             <a:r>
-              <a:rPr lang="en-US" b="1" dirty="0" smtClean="0"/>
-              <a:t>ReentrantLock</a:t>
+              <a:rPr lang="en-US" dirty="0" smtClean="0"/>
+              <a:t>Heap Vs Stack</a:t>
             </a:r>
             <a:endParaRPr lang="en-US" dirty="0"/>
           </a:p>
@@ -7135,59 +7095,77 @@
           <a:p>
             <a:r>
               <a:rPr lang="en-US" sz="1600" dirty="0" smtClean="0"/>
-              <a:t>Synchronized keyword shortcomings – can’t extend lock beyond a method or block boundary</a:t>
-            </a:r>
-          </a:p>
-          <a:p>
-            <a:r>
-              <a:rPr lang="en-US" sz="1600" dirty="0" smtClean="0">
-                <a:sym typeface="Wingdings" panose="05000000000000000000" pitchFamily="2" charset="2"/>
-              </a:rPr>
-              <a:t>Java 5 solves this problem using </a:t>
-            </a:r>
-            <a:r>
-              <a:rPr lang="en-US" sz="1600" b="1" dirty="0" smtClean="0">
-                <a:solidFill>
-                  <a:srgbClr val="00B050"/>
-                </a:solidFill>
-                <a:sym typeface="Wingdings" panose="05000000000000000000" pitchFamily="2" charset="2"/>
-              </a:rPr>
-              <a:t>Lock</a:t>
-            </a:r>
-            <a:r>
-              <a:rPr lang="en-US" sz="1600" dirty="0" smtClean="0">
-                <a:solidFill>
-                  <a:srgbClr val="00B050"/>
-                </a:solidFill>
-                <a:sym typeface="Wingdings" panose="05000000000000000000" pitchFamily="2" charset="2"/>
-              </a:rPr>
-              <a:t> </a:t>
-            </a:r>
-            <a:r>
-              <a:rPr lang="en-US" sz="1600" dirty="0" smtClean="0">
-                <a:sym typeface="Wingdings" panose="05000000000000000000" pitchFamily="2" charset="2"/>
-              </a:rPr>
-              <a:t>interface</a:t>
-            </a:r>
-          </a:p>
-          <a:p>
-            <a:r>
-              <a:rPr lang="en-GB" sz="1600" b="1" dirty="0"/>
-              <a:t>ReentrantLock</a:t>
-            </a:r>
-            <a:r>
-              <a:rPr lang="en-GB" sz="1600" dirty="0"/>
-              <a:t> is a common implementation of Lock interface and provides re-entrant mutual exclusion Lock with the same basic behavior and semantics as the implicit monitor lock accessed using synchronized methods and statements, but with extended </a:t>
+              <a:t>Heap – Main memory, shared across all threads</a:t>
+            </a:r>
+          </a:p>
+          <a:p>
+            <a:r>
+              <a:rPr lang="en-US" sz="1600" dirty="0" smtClean="0"/>
+              <a:t>Stack – Thread memory, specific to thread</a:t>
+            </a:r>
+          </a:p>
+          <a:p>
+            <a:r>
+              <a:rPr lang="en-US" sz="1600" dirty="0" smtClean="0"/>
+              <a:t>-Xss parameter – used to control stack size of Thread</a:t>
+            </a:r>
+          </a:p>
+          <a:p>
+            <a:r>
+              <a:rPr lang="en-GB" sz="1600" dirty="0"/>
+              <a:t>-</a:t>
+            </a:r>
+            <a:r>
+              <a:rPr lang="en-GB" sz="1600" dirty="0" err="1"/>
+              <a:t>Xms</a:t>
+            </a:r>
+            <a:r>
+              <a:rPr lang="en-GB" sz="1600" dirty="0"/>
+              <a:t>&lt;size&gt; - Set initial Java heap </a:t>
             </a:r>
             <a:r>
               <a:rPr lang="en-GB" sz="1600" dirty="0" smtClean="0"/>
-              <a:t>capabilities</a:t>
-            </a:r>
-          </a:p>
-          <a:p>
+              <a:t>size</a:t>
+            </a:r>
+          </a:p>
+          <a:p>
+            <a:r>
+              <a:rPr lang="en-GB" sz="1600" dirty="0"/>
+              <a:t>-Xmx&lt;size&gt; - Set maximum Java heap </a:t>
+            </a:r>
             <a:r>
               <a:rPr lang="en-GB" sz="1600" dirty="0" smtClean="0"/>
-              <a:t>Key features of ReentrantLock:</a:t>
+              <a:t>size</a:t>
+            </a:r>
+          </a:p>
+          <a:p>
+            <a:r>
+              <a:rPr lang="en-GB" sz="1600" dirty="0"/>
+              <a:t>-XX:PermSize&lt;size&gt; - Set initial PermGen </a:t>
+            </a:r>
+            <a:r>
+              <a:rPr lang="en-GB" sz="1600" dirty="0" smtClean="0"/>
+              <a:t>size </a:t>
+            </a:r>
+          </a:p>
+          <a:p>
+            <a:r>
+              <a:rPr lang="en-GB" sz="1600" dirty="0" smtClean="0"/>
+              <a:t>-</a:t>
+            </a:r>
+            <a:r>
+              <a:rPr lang="en-GB" sz="1600" dirty="0"/>
+              <a:t>XX:MaxPermSize&lt;size&gt; - Set the maximum PermGen </a:t>
+            </a:r>
+            <a:r>
+              <a:rPr lang="en-GB" sz="1600" dirty="0" smtClean="0"/>
+              <a:t>size</a:t>
+            </a:r>
+          </a:p>
+          <a:p>
+            <a:r>
+              <a:rPr lang="en-GB" sz="1600" dirty="0" smtClean="0"/>
+              <a:t>Thread Dump:</a:t>
             </a:r>
           </a:p>
           <a:p>
@@ -7197,15 +7175,13 @@
             </a:pPr>
             <a:r>
               <a:rPr lang="en-GB" sz="1400" dirty="0" smtClean="0"/>
-              <a:t>Provides </a:t>
-            </a:r>
-            <a:r>
-              <a:rPr lang="en-GB" sz="1400" dirty="0"/>
-              <a:t>more control on lock acquisition is trying to get a lock with ability to </a:t>
-            </a:r>
-            <a:r>
-              <a:rPr lang="en-GB" sz="1400" dirty="0" smtClean="0"/>
-              <a:t>interrupt</a:t>
+              <a:t>kill -3 command </a:t>
+            </a:r>
+            <a:r>
+              <a:rPr lang="en-GB" sz="1400" dirty="0" smtClean="0">
+                <a:sym typeface="Wingdings" panose="05000000000000000000" pitchFamily="2" charset="2"/>
+              </a:rPr>
+              <a:t> </a:t>
             </a:r>
           </a:p>
           <a:p>
@@ -7214,16 +7190,10 @@
               <a:buChar char="Ø"/>
             </a:pPr>
             <a:r>
-              <a:rPr lang="en-GB" sz="1400" dirty="0" smtClean="0"/>
-              <a:t>A </a:t>
-            </a:r>
-            <a:r>
-              <a:rPr lang="en-GB" sz="1400" dirty="0"/>
-              <a:t>timeout on waiting for </a:t>
-            </a:r>
-            <a:r>
-              <a:rPr lang="en-GB" sz="1400" dirty="0" smtClean="0"/>
-              <a:t>lock</a:t>
+              <a:rPr lang="en-GB" sz="1400" dirty="0" smtClean="0">
+                <a:sym typeface="Wingdings" panose="05000000000000000000" pitchFamily="2" charset="2"/>
+              </a:rPr>
+              <a:t>Ctrl + Break </a:t>
             </a:r>
           </a:p>
           <a:p>
@@ -7232,8 +7202,10 @@
               <a:buChar char="Ø"/>
             </a:pPr>
             <a:r>
-              <a:rPr lang="en-GB" sz="1400" dirty="0" smtClean="0"/>
-              <a:t>Provides convenient method to get List of all threads waiting for lock</a:t>
+              <a:rPr lang="en-GB" sz="1400" dirty="0" smtClean="0">
+                <a:sym typeface="Wingdings" panose="05000000000000000000" pitchFamily="2" charset="2"/>
+              </a:rPr>
+              <a:t>jstack – to get the thread dump</a:t>
             </a:r>
           </a:p>
           <a:p>
@@ -7242,8 +7214,10 @@
               <a:buChar char="Ø"/>
             </a:pPr>
             <a:r>
-              <a:rPr lang="en-GB" sz="1400" dirty="0" smtClean="0"/>
-              <a:t>Power to create fair lock – Provide lock to longest waiting thread</a:t>
+              <a:rPr lang="en-GB" sz="1400" dirty="0" smtClean="0">
+                <a:sym typeface="Wingdings" panose="05000000000000000000" pitchFamily="2" charset="2"/>
+              </a:rPr>
+              <a:t>jps – to find the process id</a:t>
             </a:r>
           </a:p>
           <a:p>
@@ -7251,54 +7225,7 @@
               <a:buFont typeface="Wingdings" panose="05000000000000000000" pitchFamily="2" charset="2"/>
               <a:buChar char="Ø"/>
             </a:pPr>
-            <a:r>
-              <a:rPr lang="en-GB" sz="1400" dirty="0" smtClean="0"/>
-              <a:t>unlock() – should be coded in finally block</a:t>
-            </a:r>
-          </a:p>
-          <a:p>
-            <a:r>
-              <a:rPr lang="en-GB" sz="1600" dirty="0" smtClean="0"/>
-              <a:t>Disadvantages of </a:t>
-            </a:r>
-            <a:r>
-              <a:rPr lang="en-GB" sz="1600" dirty="0"/>
-              <a:t>ReentrantLock:</a:t>
-            </a:r>
-          </a:p>
-          <a:p>
-            <a:pPr lvl="1">
-              <a:buFont typeface="Wingdings" panose="05000000000000000000" pitchFamily="2" charset="2"/>
-              <a:buChar char="Ø"/>
-            </a:pPr>
-            <a:r>
-              <a:rPr lang="en-GB" sz="1400" dirty="0" smtClean="0"/>
-              <a:t>Programmer is responsible for acquiring and releasing lock</a:t>
-            </a:r>
-            <a:r>
-              <a:rPr lang="en-GB" sz="1400" dirty="0"/>
-              <a:t/>
-            </a:r>
-            <a:br>
-              <a:rPr lang="en-GB" sz="1400" dirty="0"/>
-            </a:br>
-            <a:r>
-              <a:rPr lang="en-GB" sz="1200" dirty="0"/>
-              <a:t/>
-            </a:r>
-            <a:br>
-              <a:rPr lang="en-GB" sz="1200" dirty="0"/>
-            </a:br>
-            <a:endParaRPr lang="en-GB" sz="1200" dirty="0" smtClean="0">
-              <a:sym typeface="Wingdings" panose="05000000000000000000" pitchFamily="2" charset="2"/>
-            </a:endParaRPr>
-          </a:p>
-          <a:p>
-            <a:pPr lvl="1">
-              <a:buFont typeface="Wingdings" panose="05000000000000000000" pitchFamily="2" charset="2"/>
-              <a:buChar char="Ø"/>
-            </a:pPr>
-            <a:endParaRPr lang="en-GB" sz="1600" dirty="0" smtClean="0">
+            <a:endParaRPr lang="en-GB" sz="1400" dirty="0" smtClean="0">
               <a:sym typeface="Wingdings" panose="05000000000000000000" pitchFamily="2" charset="2"/>
             </a:endParaRPr>
           </a:p>
@@ -7310,7 +7237,7 @@
     </p:spTree>
     <p:extLst>
       <p:ext uri="{BB962C8B-B14F-4D97-AF65-F5344CB8AC3E}">
-        <p14:creationId xmlns:p14="http://schemas.microsoft.com/office/powerpoint/2010/main" val="3612159754"/>
+        <p14:creationId xmlns:p14="http://schemas.microsoft.com/office/powerpoint/2010/main" val="3841733265"/>
       </p:ext>
     </p:extLst>
   </p:cSld>
@@ -7361,7 +7288,7 @@
           <a:p>
             <a:r>
               <a:rPr lang="en-US" b="1" dirty="0" smtClean="0"/>
-              <a:t>Thread Sequencing</a:t>
+              <a:t>ReentrantLock</a:t>
             </a:r>
             <a:endParaRPr lang="en-US" dirty="0"/>
           </a:p>
@@ -7386,38 +7313,153 @@
           <a:p>
             <a:r>
               <a:rPr lang="en-US" sz="1600" dirty="0" smtClean="0"/>
-              <a:t>join() method can be used to achieve sequencing in thread</a:t>
-            </a:r>
-          </a:p>
-          <a:p>
-            <a:r>
-              <a:rPr lang="en-US" sz="1600" dirty="0" smtClean="0"/>
-              <a:t>join() method to start a thread when another thread finished its execution</a:t>
-            </a:r>
-          </a:p>
-          <a:p>
-            <a:r>
-              <a:rPr lang="en-US" sz="1600" dirty="0" smtClean="0"/>
-              <a:t>Example – T1, T2 and T3 are three threads</a:t>
-            </a:r>
-          </a:p>
-          <a:p>
-            <a:r>
-              <a:rPr lang="en-US" sz="1600" dirty="0" smtClean="0"/>
-              <a:t>Call T3 join T2.join</a:t>
-            </a:r>
-          </a:p>
-          <a:p>
-            <a:r>
-              <a:rPr lang="en-US" sz="1600" dirty="0" smtClean="0"/>
-              <a:t>Call T2 join T1.join</a:t>
-            </a:r>
-          </a:p>
-          <a:p>
+              <a:t>Synchronized keyword shortcomings – can’t extend lock beyond a method or block boundary</a:t>
+            </a:r>
+          </a:p>
+          <a:p>
+            <a:r>
+              <a:rPr lang="en-US" sz="1600" dirty="0" smtClean="0">
+                <a:sym typeface="Wingdings" panose="05000000000000000000" pitchFamily="2" charset="2"/>
+              </a:rPr>
+              <a:t>Java 5 solves this problem using </a:t>
+            </a:r>
+            <a:r>
+              <a:rPr lang="en-US" sz="1600" b="1" dirty="0" smtClean="0">
+                <a:solidFill>
+                  <a:srgbClr val="00B050"/>
+                </a:solidFill>
+                <a:sym typeface="Wingdings" panose="05000000000000000000" pitchFamily="2" charset="2"/>
+              </a:rPr>
+              <a:t>Lock</a:t>
+            </a:r>
+            <a:r>
+              <a:rPr lang="en-US" sz="1600" dirty="0" smtClean="0">
+                <a:solidFill>
+                  <a:srgbClr val="00B050"/>
+                </a:solidFill>
+                <a:sym typeface="Wingdings" panose="05000000000000000000" pitchFamily="2" charset="2"/>
+              </a:rPr>
+              <a:t> </a:t>
+            </a:r>
+            <a:r>
+              <a:rPr lang="en-US" sz="1600" dirty="0" smtClean="0">
+                <a:sym typeface="Wingdings" panose="05000000000000000000" pitchFamily="2" charset="2"/>
+              </a:rPr>
+              <a:t>interface</a:t>
+            </a:r>
+          </a:p>
+          <a:p>
+            <a:r>
+              <a:rPr lang="en-GB" sz="1600" b="1" dirty="0"/>
+              <a:t>ReentrantLock</a:t>
+            </a:r>
+            <a:r>
+              <a:rPr lang="en-GB" sz="1600" dirty="0"/>
+              <a:t> is a common implementation of Lock interface and provides re-entrant mutual exclusion Lock with the same basic behavior and semantics as the implicit monitor lock accessed using synchronized methods and statements, but with extended </a:t>
+            </a:r>
             <a:r>
               <a:rPr lang="en-GB" sz="1600" dirty="0" smtClean="0"/>
-              <a:t>This will make sure that T1 finishes first, T2 second and T3 third</a:t>
-            </a:r>
+              <a:t>capabilities</a:t>
+            </a:r>
+          </a:p>
+          <a:p>
+            <a:r>
+              <a:rPr lang="en-GB" sz="1600" dirty="0" smtClean="0"/>
+              <a:t>Key features of ReentrantLock:</a:t>
+            </a:r>
+          </a:p>
+          <a:p>
+            <a:pPr lvl="1">
+              <a:buFont typeface="Wingdings" panose="05000000000000000000" pitchFamily="2" charset="2"/>
+              <a:buChar char="Ø"/>
+            </a:pPr>
+            <a:r>
+              <a:rPr lang="en-GB" sz="1400" dirty="0" smtClean="0"/>
+              <a:t>Provides </a:t>
+            </a:r>
+            <a:r>
+              <a:rPr lang="en-GB" sz="1400" dirty="0"/>
+              <a:t>more control on lock acquisition is trying to get a lock with ability to </a:t>
+            </a:r>
+            <a:r>
+              <a:rPr lang="en-GB" sz="1400" dirty="0" smtClean="0"/>
+              <a:t>interrupt</a:t>
+            </a:r>
+          </a:p>
+          <a:p>
+            <a:pPr lvl="1">
+              <a:buFont typeface="Wingdings" panose="05000000000000000000" pitchFamily="2" charset="2"/>
+              <a:buChar char="Ø"/>
+            </a:pPr>
+            <a:r>
+              <a:rPr lang="en-GB" sz="1400" dirty="0" smtClean="0"/>
+              <a:t>A </a:t>
+            </a:r>
+            <a:r>
+              <a:rPr lang="en-GB" sz="1400" dirty="0"/>
+              <a:t>timeout on waiting for </a:t>
+            </a:r>
+            <a:r>
+              <a:rPr lang="en-GB" sz="1400" dirty="0" smtClean="0"/>
+              <a:t>lock</a:t>
+            </a:r>
+          </a:p>
+          <a:p>
+            <a:pPr lvl="1">
+              <a:buFont typeface="Wingdings" panose="05000000000000000000" pitchFamily="2" charset="2"/>
+              <a:buChar char="Ø"/>
+            </a:pPr>
+            <a:r>
+              <a:rPr lang="en-GB" sz="1400" dirty="0" smtClean="0"/>
+              <a:t>Provides convenient method to get List of all threads waiting for lock</a:t>
+            </a:r>
+          </a:p>
+          <a:p>
+            <a:pPr lvl="1">
+              <a:buFont typeface="Wingdings" panose="05000000000000000000" pitchFamily="2" charset="2"/>
+              <a:buChar char="Ø"/>
+            </a:pPr>
+            <a:r>
+              <a:rPr lang="en-GB" sz="1400" dirty="0" smtClean="0"/>
+              <a:t>Power to create fair lock – Provide lock to longest waiting thread</a:t>
+            </a:r>
+          </a:p>
+          <a:p>
+            <a:pPr lvl="1">
+              <a:buFont typeface="Wingdings" panose="05000000000000000000" pitchFamily="2" charset="2"/>
+              <a:buChar char="Ø"/>
+            </a:pPr>
+            <a:r>
+              <a:rPr lang="en-GB" sz="1400" dirty="0" smtClean="0"/>
+              <a:t>unlock() – should be coded in finally block</a:t>
+            </a:r>
+          </a:p>
+          <a:p>
+            <a:r>
+              <a:rPr lang="en-GB" sz="1600" dirty="0" smtClean="0"/>
+              <a:t>Disadvantages of </a:t>
+            </a:r>
+            <a:r>
+              <a:rPr lang="en-GB" sz="1600" dirty="0"/>
+              <a:t>ReentrantLock:</a:t>
+            </a:r>
+          </a:p>
+          <a:p>
+            <a:pPr lvl="1">
+              <a:buFont typeface="Wingdings" panose="05000000000000000000" pitchFamily="2" charset="2"/>
+              <a:buChar char="Ø"/>
+            </a:pPr>
+            <a:r>
+              <a:rPr lang="en-GB" sz="1400" dirty="0" smtClean="0"/>
+              <a:t>Programmer is responsible for acquiring and releasing lock</a:t>
+            </a:r>
+            <a:r>
+              <a:rPr lang="en-GB" sz="1400" dirty="0"/>
+              <a:t/>
+            </a:r>
+            <a:br>
+              <a:rPr lang="en-GB" sz="1400" dirty="0"/>
+            </a:br>
             <a:r>
               <a:rPr lang="en-GB" sz="1200" dirty="0"/>
               <a:t/>
@@ -7446,7 +7488,7 @@
     </p:spTree>
     <p:extLst>
       <p:ext uri="{BB962C8B-B14F-4D97-AF65-F5344CB8AC3E}">
-        <p14:creationId xmlns:p14="http://schemas.microsoft.com/office/powerpoint/2010/main" val="3042288803"/>
+        <p14:creationId xmlns:p14="http://schemas.microsoft.com/office/powerpoint/2010/main" val="3612159754"/>
       </p:ext>
     </p:extLst>
   </p:cSld>
@@ -7497,7 +7539,7 @@
           <a:p>
             <a:r>
               <a:rPr lang="en-US" b="1" dirty="0" smtClean="0"/>
-              <a:t>Semaphore</a:t>
+              <a:t>Thread Sequencing</a:t>
             </a:r>
             <a:endParaRPr lang="en-US" dirty="0"/>
           </a:p>
@@ -7522,40 +7564,54 @@
           <a:p>
             <a:r>
               <a:rPr lang="en-US" sz="1600" dirty="0" smtClean="0"/>
-              <a:t>Semaphore is a new kind of synchronizer</a:t>
-            </a:r>
-          </a:p>
-          <a:p>
-            <a:r>
-              <a:rPr lang="en-US" sz="1600" dirty="0" smtClean="0">
-                <a:sym typeface="Wingdings" panose="05000000000000000000" pitchFamily="2" charset="2"/>
-              </a:rPr>
-              <a:t>acquire() blocks if necessary until the permit is available</a:t>
-            </a:r>
-          </a:p>
-          <a:p>
-            <a:r>
-              <a:rPr lang="en-US" sz="1600" dirty="0" smtClean="0">
-                <a:sym typeface="Wingdings" panose="05000000000000000000" pitchFamily="2" charset="2"/>
-              </a:rPr>
-              <a:t>release() – releases the acquired lock</a:t>
-            </a:r>
-          </a:p>
-          <a:p>
-            <a:r>
-              <a:rPr lang="en-US" sz="1600" dirty="0" smtClean="0">
-                <a:sym typeface="Wingdings" panose="05000000000000000000" pitchFamily="2" charset="2"/>
-              </a:rPr>
-              <a:t>Semaphore just keeps the count of the number available</a:t>
-            </a:r>
-          </a:p>
-          <a:p>
-            <a:r>
-              <a:rPr lang="en-US" sz="1600" dirty="0" smtClean="0">
-                <a:sym typeface="Wingdings" panose="05000000000000000000" pitchFamily="2" charset="2"/>
-              </a:rPr>
-              <a:t>Semaphore is used to protect an expensive resource which is available in fixed number e.g. database connection in the pool</a:t>
-            </a:r>
+              <a:t>join() method can be used to achieve sequencing in thread</a:t>
+            </a:r>
+          </a:p>
+          <a:p>
+            <a:r>
+              <a:rPr lang="en-US" sz="1600" dirty="0" smtClean="0"/>
+              <a:t>join() method to start a thread when another thread finished its execution</a:t>
+            </a:r>
+          </a:p>
+          <a:p>
+            <a:r>
+              <a:rPr lang="en-US" sz="1600" dirty="0" smtClean="0"/>
+              <a:t>Example – T1, T2 and T3 are three threads</a:t>
+            </a:r>
+          </a:p>
+          <a:p>
+            <a:r>
+              <a:rPr lang="en-US" sz="1600" dirty="0" smtClean="0"/>
+              <a:t>Call T3 join T2.join</a:t>
+            </a:r>
+          </a:p>
+          <a:p>
+            <a:r>
+              <a:rPr lang="en-US" sz="1600" dirty="0" smtClean="0"/>
+              <a:t>Call T2 join T1.join</a:t>
+            </a:r>
+          </a:p>
+          <a:p>
+            <a:r>
+              <a:rPr lang="en-GB" sz="1600" dirty="0" smtClean="0"/>
+              <a:t>This will make sure that T1 finishes first, T2 second and T3 third</a:t>
+            </a:r>
+            <a:r>
+              <a:rPr lang="en-GB" sz="1200" dirty="0"/>
+              <a:t/>
+            </a:r>
+            <a:br>
+              <a:rPr lang="en-GB" sz="1200" dirty="0"/>
+            </a:br>
+            <a:endParaRPr lang="en-GB" sz="1200" dirty="0" smtClean="0">
+              <a:sym typeface="Wingdings" panose="05000000000000000000" pitchFamily="2" charset="2"/>
+            </a:endParaRPr>
+          </a:p>
+          <a:p>
+            <a:pPr lvl="1">
+              <a:buFont typeface="Wingdings" panose="05000000000000000000" pitchFamily="2" charset="2"/>
+              <a:buChar char="Ø"/>
+            </a:pPr>
             <a:endParaRPr lang="en-GB" sz="1600" dirty="0" smtClean="0">
               <a:sym typeface="Wingdings" panose="05000000000000000000" pitchFamily="2" charset="2"/>
             </a:endParaRPr>
@@ -7568,7 +7624,7 @@
     </p:spTree>
     <p:extLst>
       <p:ext uri="{BB962C8B-B14F-4D97-AF65-F5344CB8AC3E}">
-        <p14:creationId xmlns:p14="http://schemas.microsoft.com/office/powerpoint/2010/main" val="249752045"/>
+        <p14:creationId xmlns:p14="http://schemas.microsoft.com/office/powerpoint/2010/main" val="3042288803"/>
       </p:ext>
     </p:extLst>
   </p:cSld>
@@ -7619,7 +7675,7 @@
           <a:p>
             <a:r>
               <a:rPr lang="en-US" b="1" dirty="0" smtClean="0"/>
-              <a:t>ThreadPool</a:t>
+              <a:t>Semaphore</a:t>
             </a:r>
             <a:endParaRPr lang="en-US" dirty="0"/>
           </a:p>
@@ -7644,104 +7700,41 @@
           <a:p>
             <a:r>
               <a:rPr lang="en-US" sz="1600" dirty="0" smtClean="0"/>
-              <a:t>ThreadPool has pool of threads</a:t>
-            </a:r>
-          </a:p>
-          <a:p>
-            <a:r>
-              <a:rPr lang="en-GB" sz="1600" dirty="0"/>
-              <a:t>ThreadPoolExecutor's submit() method throws RejectedExecutionException if the task cannot be scheduled for </a:t>
-            </a:r>
-            <a:r>
-              <a:rPr lang="en-GB" sz="1600" dirty="0" smtClean="0"/>
-              <a:t>execution</a:t>
-            </a:r>
-          </a:p>
-          <a:p>
-            <a:r>
-              <a:rPr lang="en-GB" sz="1600" dirty="0" smtClean="0"/>
-              <a:t>execute(Runnable command) defined in Executor interface and executes given tasks in future and it doesn’t return anything</a:t>
-            </a:r>
-          </a:p>
-          <a:p>
-            <a:r>
-              <a:rPr lang="en-GB" sz="1600" dirty="0" smtClean="0"/>
-              <a:t>submit():</a:t>
-            </a:r>
-          </a:p>
-          <a:p>
-            <a:pPr lvl="1">
-              <a:buFont typeface="Wingdings" panose="05000000000000000000" pitchFamily="2" charset="2"/>
-              <a:buChar char="Ø"/>
-            </a:pPr>
-            <a:r>
-              <a:rPr lang="en-GB" sz="1400" dirty="0" smtClean="0"/>
-              <a:t>Defined in ExecutorService interface</a:t>
-            </a:r>
-          </a:p>
-          <a:p>
-            <a:pPr lvl="1">
-              <a:buFont typeface="Wingdings" panose="05000000000000000000" pitchFamily="2" charset="2"/>
-              <a:buChar char="Ø"/>
-            </a:pPr>
-            <a:r>
-              <a:rPr lang="en-GB" sz="1400" dirty="0" smtClean="0"/>
-              <a:t>Can take either Runnable or Callable task</a:t>
-            </a:r>
-          </a:p>
-          <a:p>
-            <a:pPr lvl="1">
-              <a:buFont typeface="Wingdings" panose="05000000000000000000" pitchFamily="2" charset="2"/>
-              <a:buChar char="Ø"/>
-            </a:pPr>
-            <a:r>
-              <a:rPr lang="en-GB" sz="1400" dirty="0" smtClean="0"/>
-              <a:t>Can return future object</a:t>
-            </a:r>
-          </a:p>
-          <a:p>
-            <a:r>
-              <a:rPr lang="en-GB" sz="1600" dirty="0" smtClean="0"/>
-              <a:t>Different types of ThreadPool:</a:t>
-            </a:r>
-          </a:p>
-          <a:p>
-            <a:pPr lvl="1">
-              <a:buFont typeface="Wingdings" panose="05000000000000000000" pitchFamily="2" charset="2"/>
-              <a:buChar char="Ø"/>
-            </a:pPr>
-            <a:r>
-              <a:rPr lang="en-GB" sz="1400" dirty="0" smtClean="0"/>
-              <a:t>Single thread pool</a:t>
-            </a:r>
-          </a:p>
-          <a:p>
-            <a:pPr lvl="1">
-              <a:buFont typeface="Wingdings" panose="05000000000000000000" pitchFamily="2" charset="2"/>
-              <a:buChar char="Ø"/>
-            </a:pPr>
-            <a:r>
-              <a:rPr lang="en-GB" sz="1400" dirty="0" smtClean="0"/>
-              <a:t>Fixed thread pool</a:t>
-            </a:r>
-          </a:p>
-          <a:p>
-            <a:pPr lvl="1">
-              <a:buFont typeface="Wingdings" panose="05000000000000000000" pitchFamily="2" charset="2"/>
-              <a:buChar char="Ø"/>
-            </a:pPr>
-            <a:r>
-              <a:rPr lang="en-GB" sz="1400" dirty="0" smtClean="0"/>
-              <a:t>Cached thread pool</a:t>
-            </a:r>
-            <a:r>
-              <a:rPr lang="en-GB" sz="1200" dirty="0"/>
-              <a:t/>
-            </a:r>
-            <a:br>
-              <a:rPr lang="en-GB" sz="1200" dirty="0"/>
-            </a:br>
-            <a:endParaRPr lang="en-GB" sz="1200" dirty="0" smtClean="0">
+              <a:t>Semaphore is a new kind of synchronizer</a:t>
+            </a:r>
+          </a:p>
+          <a:p>
+            <a:r>
+              <a:rPr lang="en-US" sz="1600" dirty="0" smtClean="0">
+                <a:sym typeface="Wingdings" panose="05000000000000000000" pitchFamily="2" charset="2"/>
+              </a:rPr>
+              <a:t>acquire() blocks if necessary until the permit is available</a:t>
+            </a:r>
+          </a:p>
+          <a:p>
+            <a:r>
+              <a:rPr lang="en-US" sz="1600" dirty="0" smtClean="0">
+                <a:sym typeface="Wingdings" panose="05000000000000000000" pitchFamily="2" charset="2"/>
+              </a:rPr>
+              <a:t>release() – releases the acquired lock</a:t>
+            </a:r>
+          </a:p>
+          <a:p>
+            <a:r>
+              <a:rPr lang="en-US" sz="1600" dirty="0" smtClean="0">
+                <a:sym typeface="Wingdings" panose="05000000000000000000" pitchFamily="2" charset="2"/>
+              </a:rPr>
+              <a:t>Semaphore just keeps the count of the number available</a:t>
+            </a:r>
+          </a:p>
+          <a:p>
+            <a:r>
+              <a:rPr lang="en-US" sz="1600" dirty="0" smtClean="0">
+                <a:sym typeface="Wingdings" panose="05000000000000000000" pitchFamily="2" charset="2"/>
+              </a:rPr>
+              <a:t>Semaphore is used to protect an expensive resource which is available in fixed number e.g. database connection in the pool</a:t>
+            </a:r>
+            <a:endParaRPr lang="en-GB" sz="1600" dirty="0" smtClean="0">
               <a:sym typeface="Wingdings" panose="05000000000000000000" pitchFamily="2" charset="2"/>
             </a:endParaRPr>
           </a:p>
@@ -7753,7 +7746,7 @@
     </p:spTree>
     <p:extLst>
       <p:ext uri="{BB962C8B-B14F-4D97-AF65-F5344CB8AC3E}">
-        <p14:creationId xmlns:p14="http://schemas.microsoft.com/office/powerpoint/2010/main" val="3869429020"/>
+        <p14:creationId xmlns:p14="http://schemas.microsoft.com/office/powerpoint/2010/main" val="249752045"/>
       </p:ext>
     </p:extLst>
   </p:cSld>
@@ -7804,7 +7797,7 @@
           <a:p>
             <a:r>
               <a:rPr lang="en-US" b="1" dirty="0" smtClean="0"/>
-              <a:t>ReadWriteLock</a:t>
+              <a:t>ThreadPool</a:t>
             </a:r>
             <a:endParaRPr lang="en-US" dirty="0"/>
           </a:p>
@@ -7829,48 +7822,108 @@
           <a:p>
             <a:r>
               <a:rPr lang="en-US" sz="1600" dirty="0" smtClean="0"/>
-              <a:t>Read write lock is the result of lock stripping technique to improve the performance of concurrency applications</a:t>
-            </a:r>
-          </a:p>
-          <a:p>
-            <a:r>
-              <a:rPr lang="en-US" sz="1600" dirty="0" smtClean="0"/>
-              <a:t>ReadWriteLock Interface</a:t>
-            </a:r>
-            <a:endParaRPr lang="en-GB" sz="1600" dirty="0" smtClean="0">
+              <a:t>ThreadPool has pool of threads</a:t>
+            </a:r>
+          </a:p>
+          <a:p>
+            <a:r>
+              <a:rPr lang="en-GB" sz="1600" dirty="0"/>
+              <a:t>ThreadPoolExecutor's submit() method throws RejectedExecutionException if the task cannot be scheduled for </a:t>
+            </a:r>
+            <a:r>
+              <a:rPr lang="en-GB" sz="1600" dirty="0" smtClean="0"/>
+              <a:t>execution</a:t>
+            </a:r>
+          </a:p>
+          <a:p>
+            <a:r>
+              <a:rPr lang="en-GB" sz="1600" dirty="0" smtClean="0"/>
+              <a:t>execute(Runnable command) defined in Executor interface and executes given tasks in future and it doesn’t return anything</a:t>
+            </a:r>
+          </a:p>
+          <a:p>
+            <a:r>
+              <a:rPr lang="en-GB" sz="1600" dirty="0" smtClean="0"/>
+              <a:t>submit():</a:t>
+            </a:r>
+          </a:p>
+          <a:p>
+            <a:pPr lvl="1">
+              <a:buFont typeface="Wingdings" panose="05000000000000000000" pitchFamily="2" charset="2"/>
+              <a:buChar char="Ø"/>
+            </a:pPr>
+            <a:r>
+              <a:rPr lang="en-GB" sz="1400" dirty="0" smtClean="0"/>
+              <a:t>Defined in ExecutorService interface</a:t>
+            </a:r>
+          </a:p>
+          <a:p>
+            <a:pPr lvl="1">
+              <a:buFont typeface="Wingdings" panose="05000000000000000000" pitchFamily="2" charset="2"/>
+              <a:buChar char="Ø"/>
+            </a:pPr>
+            <a:r>
+              <a:rPr lang="en-GB" sz="1400" dirty="0" smtClean="0"/>
+              <a:t>Can take either Runnable or Callable task</a:t>
+            </a:r>
+          </a:p>
+          <a:p>
+            <a:pPr lvl="1">
+              <a:buFont typeface="Wingdings" panose="05000000000000000000" pitchFamily="2" charset="2"/>
+              <a:buChar char="Ø"/>
+            </a:pPr>
+            <a:r>
+              <a:rPr lang="en-GB" sz="1400" dirty="0" smtClean="0"/>
+              <a:t>Can return future object</a:t>
+            </a:r>
+          </a:p>
+          <a:p>
+            <a:r>
+              <a:rPr lang="en-GB" sz="1600" dirty="0" smtClean="0"/>
+              <a:t>Different types of ThreadPool:</a:t>
+            </a:r>
+          </a:p>
+          <a:p>
+            <a:pPr lvl="1">
+              <a:buFont typeface="Wingdings" panose="05000000000000000000" pitchFamily="2" charset="2"/>
+              <a:buChar char="Ø"/>
+            </a:pPr>
+            <a:r>
+              <a:rPr lang="en-GB" sz="1400" dirty="0" smtClean="0"/>
+              <a:t>Single thread pool</a:t>
+            </a:r>
+          </a:p>
+          <a:p>
+            <a:pPr lvl="1">
+              <a:buFont typeface="Wingdings" panose="05000000000000000000" pitchFamily="2" charset="2"/>
+              <a:buChar char="Ø"/>
+            </a:pPr>
+            <a:r>
+              <a:rPr lang="en-GB" sz="1400" dirty="0" smtClean="0"/>
+              <a:t>Fixed thread pool</a:t>
+            </a:r>
+          </a:p>
+          <a:p>
+            <a:pPr lvl="1">
+              <a:buFont typeface="Wingdings" panose="05000000000000000000" pitchFamily="2" charset="2"/>
+              <a:buChar char="Ø"/>
+            </a:pPr>
+            <a:r>
+              <a:rPr lang="en-GB" sz="1400" dirty="0" smtClean="0"/>
+              <a:t>Cached thread pool</a:t>
+            </a:r>
+            <a:r>
+              <a:rPr lang="en-GB" sz="1200" dirty="0"/>
+              <a:t/>
+            </a:r>
+            <a:br>
+              <a:rPr lang="en-GB" sz="1200" dirty="0"/>
+            </a:br>
+            <a:endParaRPr lang="en-GB" sz="1200" dirty="0" smtClean="0">
               <a:sym typeface="Wingdings" panose="05000000000000000000" pitchFamily="2" charset="2"/>
             </a:endParaRPr>
           </a:p>
           <a:p>
-            <a:r>
-              <a:rPr lang="en-GB" sz="1600" dirty="0"/>
-              <a:t>A ReadWriteLock maintains a pair of associated locks, one for read-only operations and one for </a:t>
-            </a:r>
-            <a:r>
-              <a:rPr lang="en-GB" sz="1600" dirty="0" smtClean="0"/>
-              <a:t>writing</a:t>
-            </a:r>
-          </a:p>
-          <a:p>
-            <a:r>
-              <a:rPr lang="en-US" sz="1600" dirty="0"/>
-              <a:t>W</a:t>
-            </a:r>
-            <a:r>
-              <a:rPr lang="en-US" sz="1600" dirty="0" smtClean="0"/>
-              <a:t>rite </a:t>
-            </a:r>
-            <a:r>
-              <a:rPr lang="en-US" sz="1600" dirty="0"/>
-              <a:t>lock is exclusive</a:t>
-            </a:r>
-            <a:r>
-              <a:rPr lang="en-GB" sz="1600" dirty="0"/>
-              <a:t/>
-            </a:r>
-            <a:br>
-              <a:rPr lang="en-GB" sz="1600" dirty="0"/>
-            </a:br>
             <a:endParaRPr lang="en-US" sz="1600" dirty="0"/>
           </a:p>
         </p:txBody>
@@ -7878,7 +7931,7 @@
     </p:spTree>
     <p:extLst>
       <p:ext uri="{BB962C8B-B14F-4D97-AF65-F5344CB8AC3E}">
-        <p14:creationId xmlns:p14="http://schemas.microsoft.com/office/powerpoint/2010/main" val="745788683"/>
+        <p14:creationId xmlns:p14="http://schemas.microsoft.com/office/powerpoint/2010/main" val="3869429020"/>
       </p:ext>
     </p:extLst>
   </p:cSld>
@@ -7929,6 +7982,131 @@
           <a:p>
             <a:r>
               <a:rPr lang="en-US" b="1" dirty="0" smtClean="0"/>
+              <a:t>ReadWriteLock</a:t>
+            </a:r>
+            <a:endParaRPr lang="en-US" dirty="0"/>
+          </a:p>
+        </p:txBody>
+      </p:sp>
+      <p:sp>
+        <p:nvSpPr>
+          <p:cNvPr id="3" name="Content Placeholder 2"/>
+          <p:cNvSpPr>
+            <a:spLocks noGrp="1"/>
+          </p:cNvSpPr>
+          <p:nvPr>
+            <p:ph idx="1"/>
+          </p:nvPr>
+        </p:nvSpPr>
+        <p:spPr/>
+        <p:txBody>
+          <a:bodyPr>
+            <a:normAutofit/>
+          </a:bodyPr>
+          <a:lstStyle/>
+          <a:p>
+            <a:r>
+              <a:rPr lang="en-US" sz="1600" dirty="0" smtClean="0"/>
+              <a:t>Read write lock is the result of lock stripping technique to improve the performance of concurrency applications</a:t>
+            </a:r>
+          </a:p>
+          <a:p>
+            <a:r>
+              <a:rPr lang="en-US" sz="1600" dirty="0" smtClean="0"/>
+              <a:t>ReadWriteLock Interface</a:t>
+            </a:r>
+            <a:endParaRPr lang="en-GB" sz="1600" dirty="0" smtClean="0">
+              <a:sym typeface="Wingdings" panose="05000000000000000000" pitchFamily="2" charset="2"/>
+            </a:endParaRPr>
+          </a:p>
+          <a:p>
+            <a:r>
+              <a:rPr lang="en-GB" sz="1600" dirty="0"/>
+              <a:t>A ReadWriteLock maintains a pair of associated locks, one for read-only operations and one for </a:t>
+            </a:r>
+            <a:r>
+              <a:rPr lang="en-GB" sz="1600" dirty="0" smtClean="0"/>
+              <a:t>writing</a:t>
+            </a:r>
+          </a:p>
+          <a:p>
+            <a:r>
+              <a:rPr lang="en-US" sz="1600" dirty="0"/>
+              <a:t>W</a:t>
+            </a:r>
+            <a:r>
+              <a:rPr lang="en-US" sz="1600" dirty="0" smtClean="0"/>
+              <a:t>rite </a:t>
+            </a:r>
+            <a:r>
+              <a:rPr lang="en-US" sz="1600" dirty="0"/>
+              <a:t>lock is exclusive</a:t>
+            </a:r>
+            <a:r>
+              <a:rPr lang="en-GB" sz="1600" dirty="0"/>
+              <a:t/>
+            </a:r>
+            <a:br>
+              <a:rPr lang="en-GB" sz="1600" dirty="0"/>
+            </a:br>
+            <a:endParaRPr lang="en-US" sz="1600" dirty="0"/>
+          </a:p>
+        </p:txBody>
+      </p:sp>
+    </p:spTree>
+    <p:extLst>
+      <p:ext uri="{BB962C8B-B14F-4D97-AF65-F5344CB8AC3E}">
+        <p14:creationId xmlns:p14="http://schemas.microsoft.com/office/powerpoint/2010/main" val="745788683"/>
+      </p:ext>
+    </p:extLst>
+  </p:cSld>
+  <p:clrMapOvr>
+    <a:masterClrMapping/>
+  </p:clrMapOvr>
+  <p:timing>
+    <p:tnLst>
+      <p:par>
+        <p:cTn id="1" dur="indefinite" restart="never" nodeType="tmRoot"/>
+      </p:par>
+    </p:tnLst>
+  </p:timing>
+</p:sld>
+</file>
+
+<file path=ppt/slides/slide36.xml><?xml version="1.0" encoding="utf-8"?>
+<p:sld xmlns:a="http://schemas.openxmlformats.org/drawingml/2006/main" xmlns:r="http://schemas.openxmlformats.org/officeDocument/2006/relationships" xmlns:p="http://schemas.openxmlformats.org/presentationml/2006/main">
+  <p:cSld>
+    <p:spTree>
+      <p:nvGrpSpPr>
+        <p:cNvPr id="1" name=""/>
+        <p:cNvGrpSpPr/>
+        <p:nvPr/>
+      </p:nvGrpSpPr>
+      <p:grpSpPr>
+        <a:xfrm>
+          <a:off x="0" y="0"/>
+          <a:ext cx="0" cy="0"/>
+          <a:chOff x="0" y="0"/>
+          <a:chExt cx="0" cy="0"/>
+        </a:xfrm>
+      </p:grpSpPr>
+      <p:sp>
+        <p:nvSpPr>
+          <p:cNvPr id="2" name="Title 1"/>
+          <p:cNvSpPr>
+            <a:spLocks noGrp="1"/>
+          </p:cNvSpPr>
+          <p:nvPr>
+            <p:ph type="title"/>
+          </p:nvPr>
+        </p:nvSpPr>
+        <p:spPr/>
+        <p:txBody>
+          <a:bodyPr/>
+          <a:lstStyle/>
+          <a:p>
+            <a:r>
+              <a:rPr lang="en-US" b="1" dirty="0" smtClean="0"/>
               <a:t>Starting and Stopping the Thread</a:t>
             </a:r>
             <a:endParaRPr lang="en-US" dirty="0"/>
@@ -8042,7 +8220,250 @@
 </p:sld>
 </file>
 
-<file path=ppt/slides/slide36.xml><?xml version="1.0" encoding="utf-8"?>
+<file path=ppt/slides/slide37.xml><?xml version="1.0" encoding="utf-8"?>
+<p:sld xmlns:a="http://schemas.openxmlformats.org/drawingml/2006/main" xmlns:r="http://schemas.openxmlformats.org/officeDocument/2006/relationships" xmlns:p="http://schemas.openxmlformats.org/presentationml/2006/main">
+  <p:cSld>
+    <p:spTree>
+      <p:nvGrpSpPr>
+        <p:cNvPr id="1" name=""/>
+        <p:cNvGrpSpPr/>
+        <p:nvPr/>
+      </p:nvGrpSpPr>
+      <p:grpSpPr>
+        <a:xfrm>
+          <a:off x="0" y="0"/>
+          <a:ext cx="0" cy="0"/>
+          <a:chOff x="0" y="0"/>
+          <a:chExt cx="0" cy="0"/>
+        </a:xfrm>
+      </p:grpSpPr>
+      <p:sp>
+        <p:nvSpPr>
+          <p:cNvPr id="2" name="Title 1"/>
+          <p:cNvSpPr>
+            <a:spLocks noGrp="1"/>
+          </p:cNvSpPr>
+          <p:nvPr>
+            <p:ph type="title"/>
+          </p:nvPr>
+        </p:nvSpPr>
+        <p:spPr/>
+        <p:txBody>
+          <a:bodyPr/>
+          <a:lstStyle/>
+          <a:p>
+            <a:r>
+              <a:rPr lang="en-US" dirty="0" smtClean="0"/>
+              <a:t>Usin</a:t>
+            </a:r>
+            <a:r>
+              <a:rPr lang="en-US" dirty="0" smtClean="0"/>
+              <a:t>g </a:t>
+            </a:r>
+            <a:r>
+              <a:rPr lang="en-US" dirty="0" smtClean="0"/>
+              <a:t>Runnable over Thread class</a:t>
+            </a:r>
+            <a:endParaRPr lang="en-US" dirty="0"/>
+          </a:p>
+        </p:txBody>
+      </p:sp>
+      <p:sp>
+        <p:nvSpPr>
+          <p:cNvPr id="3" name="Content Placeholder 2"/>
+          <p:cNvSpPr>
+            <a:spLocks noGrp="1"/>
+          </p:cNvSpPr>
+          <p:nvPr>
+            <p:ph idx="1"/>
+          </p:nvPr>
+        </p:nvSpPr>
+        <p:spPr/>
+        <p:txBody>
+          <a:bodyPr>
+            <a:normAutofit/>
+          </a:bodyPr>
+          <a:lstStyle/>
+          <a:p>
+            <a:r>
+              <a:rPr lang="en-GB" sz="1600" dirty="0" smtClean="0"/>
+              <a:t>Using Runnable interface is better for the following reasons:-</a:t>
+            </a:r>
+          </a:p>
+          <a:p>
+            <a:pPr>
+              <a:buFont typeface="Wingdings" panose="05000000000000000000" pitchFamily="2" charset="2"/>
+              <a:buChar char="Ø"/>
+            </a:pPr>
+            <a:r>
+              <a:rPr lang="en-GB" sz="1600" dirty="0" smtClean="0"/>
+              <a:t>Java doesn’t support </a:t>
+            </a:r>
+            <a:r>
+              <a:rPr lang="en-GB" sz="1600" dirty="0" smtClean="0">
+                <a:solidFill>
+                  <a:srgbClr val="FF0000"/>
+                </a:solidFill>
+              </a:rPr>
+              <a:t>multiple inheritance </a:t>
+            </a:r>
+          </a:p>
+          <a:p>
+            <a:pPr>
+              <a:buFont typeface="Wingdings" panose="05000000000000000000" pitchFamily="2" charset="2"/>
+              <a:buChar char="Ø"/>
+            </a:pPr>
+            <a:r>
+              <a:rPr lang="en-GB" sz="1600" dirty="0" smtClean="0"/>
+              <a:t>Extending the class means you are going to modify the functionality, however in this context it is not going to be the case</a:t>
+            </a:r>
+          </a:p>
+          <a:p>
+            <a:pPr>
+              <a:buFont typeface="Wingdings" panose="05000000000000000000" pitchFamily="2" charset="2"/>
+              <a:buChar char="Ø"/>
+            </a:pPr>
+            <a:r>
+              <a:rPr lang="en-GB" sz="1600" dirty="0"/>
+              <a:t>Runnable interface represent a </a:t>
+            </a:r>
+            <a:r>
+              <a:rPr lang="en-GB" sz="1600" b="1" dirty="0">
+                <a:solidFill>
+                  <a:srgbClr val="FF0000"/>
+                </a:solidFill>
+              </a:rPr>
+              <a:t>Task</a:t>
+            </a:r>
+            <a:r>
+              <a:rPr lang="en-GB" sz="1600" dirty="0">
+                <a:solidFill>
+                  <a:srgbClr val="FF0000"/>
+                </a:solidFill>
+              </a:rPr>
+              <a:t> </a:t>
+            </a:r>
+            <a:r>
+              <a:rPr lang="en-GB" sz="1600" dirty="0"/>
+              <a:t>which can be executed by either plain Thread or Executors or any other means. So logical separation of Task as Runnable than Thread is good design </a:t>
+            </a:r>
+            <a:r>
+              <a:rPr lang="en-GB" sz="1600" dirty="0" smtClean="0"/>
+              <a:t>decision</a:t>
+            </a:r>
+          </a:p>
+          <a:p>
+            <a:pPr>
+              <a:buFont typeface="Wingdings" panose="05000000000000000000" pitchFamily="2" charset="2"/>
+              <a:buChar char="Ø"/>
+            </a:pPr>
+            <a:r>
+              <a:rPr lang="en-GB" sz="1600" dirty="0"/>
+              <a:t>Separating task as Runnable means we can </a:t>
+            </a:r>
+            <a:r>
+              <a:rPr lang="en-GB" sz="1600" b="1" dirty="0">
+                <a:solidFill>
+                  <a:srgbClr val="FF0000"/>
+                </a:solidFill>
+              </a:rPr>
+              <a:t>reuse</a:t>
+            </a:r>
+            <a:r>
+              <a:rPr lang="en-GB" sz="1600" dirty="0">
+                <a:solidFill>
+                  <a:srgbClr val="FF0000"/>
+                </a:solidFill>
+              </a:rPr>
+              <a:t> </a:t>
+            </a:r>
+            <a:r>
+              <a:rPr lang="en-GB" sz="1600" dirty="0"/>
+              <a:t>the task and also has liberty to execute it from different </a:t>
+            </a:r>
+            <a:r>
+              <a:rPr lang="en-GB" sz="1600" dirty="0" smtClean="0"/>
+              <a:t>means</a:t>
+            </a:r>
+          </a:p>
+          <a:p>
+            <a:pPr>
+              <a:buFont typeface="Wingdings" panose="05000000000000000000" pitchFamily="2" charset="2"/>
+              <a:buChar char="Ø"/>
+            </a:pPr>
+            <a:r>
+              <a:rPr lang="en-GB" sz="1600" dirty="0"/>
+              <a:t>Java designer recognizes this and that's why </a:t>
+            </a:r>
+            <a:r>
+              <a:rPr lang="en-GB" sz="1600" dirty="0">
+                <a:solidFill>
+                  <a:srgbClr val="FF0000"/>
+                </a:solidFill>
+              </a:rPr>
+              <a:t>Executors</a:t>
+            </a:r>
+            <a:r>
+              <a:rPr lang="en-GB" sz="1600" dirty="0">
+                <a:solidFill>
+                  <a:srgbClr val="FF0000"/>
+                </a:solidFill>
+              </a:rPr>
+              <a:t> accept </a:t>
+            </a:r>
+            <a:r>
+              <a:rPr lang="en-GB" sz="1600" dirty="0">
+                <a:solidFill>
+                  <a:srgbClr val="FF0000"/>
+                </a:solidFill>
+              </a:rPr>
+              <a:t>Runnable</a:t>
+            </a:r>
+            <a:r>
+              <a:rPr lang="en-GB" sz="1600" dirty="0">
+                <a:solidFill>
+                  <a:srgbClr val="FF0000"/>
+                </a:solidFill>
+              </a:rPr>
+              <a:t> as </a:t>
+            </a:r>
+            <a:r>
+              <a:rPr lang="en-GB" sz="1600" dirty="0">
+                <a:solidFill>
+                  <a:srgbClr val="FF0000"/>
+                </a:solidFill>
+              </a:rPr>
+              <a:t>Task</a:t>
+            </a:r>
+            <a:r>
+              <a:rPr lang="en-GB" sz="1600" dirty="0"/>
+              <a:t> and they have worker thread which executes those task</a:t>
+            </a:r>
+            <a:endParaRPr lang="en-US" sz="1600" dirty="0"/>
+          </a:p>
+        </p:txBody>
+      </p:sp>
+    </p:spTree>
+    <p:extLst>
+      <p:ext uri="{BB962C8B-B14F-4D97-AF65-F5344CB8AC3E}">
+        <p14:creationId xmlns:p14="http://schemas.microsoft.com/office/powerpoint/2010/main" val="703515049"/>
+      </p:ext>
+    </p:extLst>
+  </p:cSld>
+  <p:clrMapOvr>
+    <a:masterClrMapping/>
+  </p:clrMapOvr>
+  <p:timing>
+    <p:tnLst>
+      <p:par>
+        <p:cTn id="1" dur="indefinite" restart="never" nodeType="tmRoot"/>
+      </p:par>
+    </p:tnLst>
+  </p:timing>
+</p:sld>
+</file>
+
+<file path=ppt/slides/slide38.xml><?xml version="1.0" encoding="utf-8"?>
 <p:sld xmlns:a="http://schemas.openxmlformats.org/drawingml/2006/main" xmlns:r="http://schemas.openxmlformats.org/officeDocument/2006/relationships" xmlns:p="http://schemas.openxmlformats.org/presentationml/2006/main">
   <p:cSld>
     <p:spTree>
@@ -8263,7 +8684,7 @@
 </p:sld>
 </file>
 
-<file path=ppt/slides/slide37.xml><?xml version="1.0" encoding="utf-8"?>
+<file path=ppt/slides/slide39.xml><?xml version="1.0" encoding="utf-8"?>
 <p:sld xmlns:a="http://schemas.openxmlformats.org/drawingml/2006/main" xmlns:r="http://schemas.openxmlformats.org/officeDocument/2006/relationships" xmlns:p="http://schemas.openxmlformats.org/presentationml/2006/main">
   <p:cSld>
     <p:spTree>
@@ -8497,352 +8918,6 @@
 </p:sld>
 </file>
 
-<file path=ppt/slides/slide38.xml><?xml version="1.0" encoding="utf-8"?>
-<p:sld xmlns:a="http://schemas.openxmlformats.org/drawingml/2006/main" xmlns:r="http://schemas.openxmlformats.org/officeDocument/2006/relationships" xmlns:p="http://schemas.openxmlformats.org/presentationml/2006/main">
-  <p:cSld>
-    <p:spTree>
-      <p:nvGrpSpPr>
-        <p:cNvPr id="1" name=""/>
-        <p:cNvGrpSpPr/>
-        <p:nvPr/>
-      </p:nvGrpSpPr>
-      <p:grpSpPr>
-        <a:xfrm>
-          <a:off x="0" y="0"/>
-          <a:ext cx="0" cy="0"/>
-          <a:chOff x="0" y="0"/>
-          <a:chExt cx="0" cy="0"/>
-        </a:xfrm>
-      </p:grpSpPr>
-      <p:sp>
-        <p:nvSpPr>
-          <p:cNvPr id="2" name="Title 1"/>
-          <p:cNvSpPr>
-            <a:spLocks noGrp="1"/>
-          </p:cNvSpPr>
-          <p:nvPr>
-            <p:ph type="title"/>
-          </p:nvPr>
-        </p:nvSpPr>
-        <p:spPr/>
-        <p:txBody>
-          <a:bodyPr/>
-          <a:lstStyle/>
-          <a:p>
-            <a:r>
-              <a:rPr lang="en-US" b="1" dirty="0" smtClean="0"/>
-              <a:t>Immutable Class</a:t>
-            </a:r>
-            <a:endParaRPr lang="en-US" dirty="0"/>
-          </a:p>
-        </p:txBody>
-      </p:sp>
-      <p:sp>
-        <p:nvSpPr>
-          <p:cNvPr id="3" name="Content Placeholder 2"/>
-          <p:cNvSpPr>
-            <a:spLocks noGrp="1"/>
-          </p:cNvSpPr>
-          <p:nvPr>
-            <p:ph idx="1"/>
-          </p:nvPr>
-        </p:nvSpPr>
-        <p:spPr/>
-        <p:txBody>
-          <a:bodyPr>
-            <a:normAutofit/>
-          </a:bodyPr>
-          <a:lstStyle/>
-          <a:p>
-            <a:r>
-              <a:rPr lang="en-US" sz="1600" dirty="0" smtClean="0"/>
-              <a:t>State of immutable object cannot be modified after construction</a:t>
-            </a:r>
-          </a:p>
-          <a:p>
-            <a:r>
-              <a:rPr lang="en-US" sz="1600" dirty="0" smtClean="0">
-                <a:sym typeface="Wingdings" panose="05000000000000000000" pitchFamily="2" charset="2"/>
-              </a:rPr>
-              <a:t>Any modification should result in another immutable object</a:t>
-            </a:r>
-          </a:p>
-          <a:p>
-            <a:r>
-              <a:rPr lang="en-US" sz="1600" dirty="0" smtClean="0">
-                <a:sym typeface="Wingdings" panose="05000000000000000000" pitchFamily="2" charset="2"/>
-              </a:rPr>
-              <a:t>Class should be defined as final</a:t>
-            </a:r>
-          </a:p>
-          <a:p>
-            <a:r>
-              <a:rPr lang="en-US" sz="1600" dirty="0" smtClean="0">
-                <a:sym typeface="Wingdings" panose="05000000000000000000" pitchFamily="2" charset="2"/>
-              </a:rPr>
-              <a:t>All fields in the class should be defined as final and private</a:t>
-            </a:r>
-          </a:p>
-          <a:p>
-            <a:r>
-              <a:rPr lang="en-GB" sz="1600" dirty="0"/>
-              <a:t>Object must be properly constructed i.e. object reference must not leak during construction </a:t>
-            </a:r>
-            <a:r>
-              <a:rPr lang="en-GB" sz="1600" dirty="0" smtClean="0"/>
-              <a:t>process</a:t>
-            </a:r>
-            <a:endParaRPr lang="en-GB" sz="1600" dirty="0"/>
-          </a:p>
-          <a:p>
-            <a:r>
-              <a:rPr lang="en-GB" sz="1600" dirty="0" smtClean="0"/>
-              <a:t>Object </a:t>
-            </a:r>
-            <a:r>
-              <a:rPr lang="en-GB" sz="1600" dirty="0"/>
-              <a:t>should be final in order to restrict sub-class for altering immutability of parent </a:t>
-            </a:r>
-            <a:r>
-              <a:rPr lang="en-GB" sz="1600" dirty="0" smtClean="0"/>
-              <a:t>class</a:t>
-            </a:r>
-          </a:p>
-          <a:p>
-            <a:r>
-              <a:rPr lang="en-GB" sz="1600" dirty="0" smtClean="0">
-                <a:sym typeface="Wingdings" panose="05000000000000000000" pitchFamily="2" charset="2"/>
-              </a:rPr>
-              <a:t>Benefits:</a:t>
-            </a:r>
-          </a:p>
-          <a:p>
-            <a:pPr lvl="1">
-              <a:buFont typeface="Wingdings" panose="05000000000000000000" pitchFamily="2" charset="2"/>
-              <a:buChar char="Ø"/>
-            </a:pPr>
-            <a:r>
-              <a:rPr lang="en-GB" sz="1400" dirty="0" smtClean="0">
-                <a:sym typeface="Wingdings" panose="05000000000000000000" pitchFamily="2" charset="2"/>
-              </a:rPr>
-              <a:t>Thread safe</a:t>
-            </a:r>
-          </a:p>
-          <a:p>
-            <a:pPr lvl="1">
-              <a:buFont typeface="Wingdings" panose="05000000000000000000" pitchFamily="2" charset="2"/>
-              <a:buChar char="Ø"/>
-            </a:pPr>
-            <a:r>
-              <a:rPr lang="en-GB" sz="1400" dirty="0" smtClean="0">
-                <a:sym typeface="Wingdings" panose="05000000000000000000" pitchFamily="2" charset="2"/>
-              </a:rPr>
-              <a:t>High performance because synchronization is not required</a:t>
-            </a:r>
-          </a:p>
-          <a:p>
-            <a:pPr>
-              <a:buFont typeface="Wingdings" panose="05000000000000000000" pitchFamily="2" charset="2"/>
-              <a:buChar char="Ø"/>
-            </a:pPr>
-            <a:r>
-              <a:rPr lang="en-GB" sz="1600" dirty="0" smtClean="0">
-                <a:sym typeface="Wingdings" panose="05000000000000000000" pitchFamily="2" charset="2"/>
-              </a:rPr>
-              <a:t>Disadvantages:</a:t>
-            </a:r>
-          </a:p>
-          <a:p>
-            <a:pPr lvl="1">
-              <a:buFont typeface="Wingdings" panose="05000000000000000000" pitchFamily="2" charset="2"/>
-              <a:buChar char="Ø"/>
-            </a:pPr>
-            <a:r>
-              <a:rPr lang="en-GB" sz="1400" dirty="0" smtClean="0">
-                <a:sym typeface="Wingdings" panose="05000000000000000000" pitchFamily="2" charset="2"/>
-              </a:rPr>
-              <a:t>Creates heavy garbage collection</a:t>
-            </a:r>
-          </a:p>
-          <a:p>
-            <a:r>
-              <a:rPr lang="en-GB" sz="1600" dirty="0" smtClean="0">
-                <a:sym typeface="Wingdings" panose="05000000000000000000" pitchFamily="2" charset="2"/>
-              </a:rPr>
-              <a:t>Importance Classes:</a:t>
-            </a:r>
-          </a:p>
-          <a:p>
-            <a:pPr lvl="1"/>
-            <a:r>
-              <a:rPr lang="en-GB" sz="1400" dirty="0" smtClean="0">
-                <a:sym typeface="Wingdings" panose="05000000000000000000" pitchFamily="2" charset="2"/>
-              </a:rPr>
-              <a:t>String</a:t>
-            </a:r>
-            <a:endParaRPr lang="en-GB" sz="1400" dirty="0">
-              <a:sym typeface="Wingdings" panose="05000000000000000000" pitchFamily="2" charset="2"/>
-            </a:endParaRPr>
-          </a:p>
-          <a:p>
-            <a:endParaRPr lang="en-US" sz="1600" dirty="0"/>
-          </a:p>
-        </p:txBody>
-      </p:sp>
-    </p:spTree>
-    <p:extLst>
-      <p:ext uri="{BB962C8B-B14F-4D97-AF65-F5344CB8AC3E}">
-        <p14:creationId xmlns:p14="http://schemas.microsoft.com/office/powerpoint/2010/main" val="736248315"/>
-      </p:ext>
-    </p:extLst>
-  </p:cSld>
-  <p:clrMapOvr>
-    <a:masterClrMapping/>
-  </p:clrMapOvr>
-  <p:timing>
-    <p:tnLst>
-      <p:par>
-        <p:cTn id="1" dur="indefinite" restart="never" nodeType="tmRoot"/>
-      </p:par>
-    </p:tnLst>
-  </p:timing>
-</p:sld>
-</file>
-
-<file path=ppt/slides/slide39.xml><?xml version="1.0" encoding="utf-8"?>
-<p:sld xmlns:a="http://schemas.openxmlformats.org/drawingml/2006/main" xmlns:r="http://schemas.openxmlformats.org/officeDocument/2006/relationships" xmlns:p="http://schemas.openxmlformats.org/presentationml/2006/main">
-  <p:cSld>
-    <p:spTree>
-      <p:nvGrpSpPr>
-        <p:cNvPr id="1" name=""/>
-        <p:cNvGrpSpPr/>
-        <p:nvPr/>
-      </p:nvGrpSpPr>
-      <p:grpSpPr>
-        <a:xfrm>
-          <a:off x="0" y="0"/>
-          <a:ext cx="0" cy="0"/>
-          <a:chOff x="0" y="0"/>
-          <a:chExt cx="0" cy="0"/>
-        </a:xfrm>
-      </p:grpSpPr>
-      <p:sp>
-        <p:nvSpPr>
-          <p:cNvPr id="2" name="Title 1"/>
-          <p:cNvSpPr>
-            <a:spLocks noGrp="1"/>
-          </p:cNvSpPr>
-          <p:nvPr>
-            <p:ph type="title"/>
-          </p:nvPr>
-        </p:nvSpPr>
-        <p:spPr/>
-        <p:txBody>
-          <a:bodyPr/>
-          <a:lstStyle/>
-          <a:p>
-            <a:r>
-              <a:rPr lang="en-US" b="1" dirty="0" smtClean="0"/>
-              <a:t>Fork-Join Framework</a:t>
-            </a:r>
-            <a:endParaRPr lang="en-US" dirty="0"/>
-          </a:p>
-        </p:txBody>
-      </p:sp>
-      <p:sp>
-        <p:nvSpPr>
-          <p:cNvPr id="3" name="Content Placeholder 2"/>
-          <p:cNvSpPr>
-            <a:spLocks noGrp="1"/>
-          </p:cNvSpPr>
-          <p:nvPr>
-            <p:ph idx="1"/>
-          </p:nvPr>
-        </p:nvSpPr>
-        <p:spPr/>
-        <p:txBody>
-          <a:bodyPr>
-            <a:normAutofit/>
-          </a:bodyPr>
-          <a:lstStyle/>
-          <a:p>
-            <a:r>
-              <a:rPr lang="en-US" sz="1600" dirty="0" smtClean="0"/>
-              <a:t>Introduced in JDK 7 </a:t>
-            </a:r>
-            <a:r>
-              <a:rPr lang="en-GB" sz="1600" dirty="0" smtClean="0"/>
-              <a:t>to </a:t>
-            </a:r>
-            <a:r>
-              <a:rPr lang="en-GB" sz="1600" dirty="0"/>
-              <a:t>take advantage of multiple processors of modern day </a:t>
-            </a:r>
-            <a:r>
-              <a:rPr lang="en-GB" sz="1600" dirty="0" smtClean="0"/>
-              <a:t>servers</a:t>
-            </a:r>
-          </a:p>
-          <a:p>
-            <a:r>
-              <a:rPr lang="en-GB" sz="1600" dirty="0"/>
-              <a:t>It is designed for work that can be broken into smaller pieces recursively. The goal is to use all the available processing power to enhance the performance of your </a:t>
-            </a:r>
-            <a:r>
-              <a:rPr lang="en-GB" sz="1600" dirty="0" smtClean="0"/>
-              <a:t>application</a:t>
-            </a:r>
-            <a:endParaRPr lang="en-GB" sz="1600" dirty="0"/>
-          </a:p>
-          <a:p>
-            <a:r>
-              <a:rPr lang="en-GB" sz="1600" dirty="0" smtClean="0"/>
-              <a:t>It uses </a:t>
-            </a:r>
-            <a:r>
-              <a:rPr lang="en-US" sz="1600" dirty="0"/>
-              <a:t>work-stealing </a:t>
-            </a:r>
-            <a:r>
-              <a:rPr lang="en-US" sz="1600" dirty="0" smtClean="0"/>
-              <a:t>algorithm</a:t>
-            </a:r>
-          </a:p>
-          <a:p>
-            <a:r>
-              <a:rPr lang="en-GB" sz="1600" dirty="0"/>
-              <a:t>Worker threads that run out of things to do can steal tasks from other threads that are still </a:t>
-            </a:r>
-            <a:r>
-              <a:rPr lang="en-GB" sz="1600" dirty="0" smtClean="0"/>
-              <a:t>busy</a:t>
-            </a:r>
-            <a:endParaRPr lang="en-GB" sz="1600" dirty="0">
-              <a:sym typeface="Wingdings" panose="05000000000000000000" pitchFamily="2" charset="2"/>
-            </a:endParaRPr>
-          </a:p>
-        </p:txBody>
-      </p:sp>
-    </p:spTree>
-    <p:extLst>
-      <p:ext uri="{BB962C8B-B14F-4D97-AF65-F5344CB8AC3E}">
-        <p14:creationId xmlns:p14="http://schemas.microsoft.com/office/powerpoint/2010/main" val="3656992556"/>
-      </p:ext>
-    </p:extLst>
-  </p:cSld>
-  <p:clrMapOvr>
-    <a:masterClrMapping/>
-  </p:clrMapOvr>
-  <p:timing>
-    <p:tnLst>
-      <p:par>
-        <p:cTn id="1" dur="indefinite" restart="never" nodeType="tmRoot"/>
-      </p:par>
-    </p:tnLst>
-  </p:timing>
-</p:sld>
-</file>
-
 <file path=ppt/slides/slide4.xml><?xml version="1.0" encoding="utf-8"?>
 <p:sld xmlns:a="http://schemas.openxmlformats.org/drawingml/2006/main" xmlns:r="http://schemas.openxmlformats.org/officeDocument/2006/relationships" xmlns:p="http://schemas.openxmlformats.org/presentationml/2006/main">
   <p:cSld>
@@ -9011,14 +9086,12 @@
         </p:nvSpPr>
         <p:spPr/>
         <p:txBody>
-          <a:bodyPr>
-            <a:normAutofit fontScale="90000"/>
-          </a:bodyPr>
+          <a:bodyPr/>
           <a:lstStyle/>
           <a:p>
             <a:r>
               <a:rPr lang="en-US" b="1" dirty="0" smtClean="0"/>
-              <a:t>Java 8 Concurrency Improvements</a:t>
+              <a:t>Immutable Class</a:t>
             </a:r>
             <a:endParaRPr lang="en-US" dirty="0"/>
           </a:p>
@@ -9042,18 +9115,65 @@
           <a:lstStyle/>
           <a:p>
             <a:r>
-              <a:rPr lang="en-GB" sz="1600" dirty="0"/>
-              <a:t>New classes and interfaces in java.util.concurrent</a:t>
-            </a:r>
-          </a:p>
-          <a:p>
-            <a:r>
-              <a:rPr lang="en-US" sz="1600" dirty="0"/>
-              <a:t>New methods in </a:t>
-            </a:r>
-            <a:r>
               <a:rPr lang="en-US" sz="1600" dirty="0" smtClean="0"/>
-              <a:t>java.util.concurrent.ConcurrentHashMap</a:t>
+              <a:t>State of immutable object cannot be modified after construction</a:t>
+            </a:r>
+          </a:p>
+          <a:p>
+            <a:r>
+              <a:rPr lang="en-US" sz="1600" dirty="0" smtClean="0">
+                <a:sym typeface="Wingdings" panose="05000000000000000000" pitchFamily="2" charset="2"/>
+              </a:rPr>
+              <a:t>Any modification should result in another immutable object</a:t>
+            </a:r>
+          </a:p>
+          <a:p>
+            <a:r>
+              <a:rPr lang="en-US" sz="1600" dirty="0" smtClean="0">
+                <a:sym typeface="Wingdings" panose="05000000000000000000" pitchFamily="2" charset="2"/>
+              </a:rPr>
+              <a:t>Class should be defined as final</a:t>
+            </a:r>
+          </a:p>
+          <a:p>
+            <a:r>
+              <a:rPr lang="en-US" sz="1600" dirty="0" smtClean="0">
+                <a:sym typeface="Wingdings" panose="05000000000000000000" pitchFamily="2" charset="2"/>
+              </a:rPr>
+              <a:t>All fields in the class should be defined as final and private</a:t>
+            </a:r>
+          </a:p>
+          <a:p>
+            <a:r>
+              <a:rPr lang="en-GB" sz="1600" dirty="0"/>
+              <a:t>Object must be properly constructed i.e. object reference must not leak during construction </a:t>
+            </a:r>
+            <a:r>
+              <a:rPr lang="en-GB" sz="1600" dirty="0" smtClean="0"/>
+              <a:t>process</a:t>
+            </a:r>
+            <a:endParaRPr lang="en-GB" sz="1600" dirty="0"/>
+          </a:p>
+          <a:p>
+            <a:r>
+              <a:rPr lang="en-GB" sz="1600" dirty="0" smtClean="0"/>
+              <a:t>Object </a:t>
+            </a:r>
+            <a:r>
+              <a:rPr lang="en-GB" sz="1600" dirty="0"/>
+              <a:t>should be final in order to restrict sub-class for altering immutability of parent </a:t>
+            </a:r>
+            <a:r>
+              <a:rPr lang="en-GB" sz="1600" dirty="0" smtClean="0"/>
+              <a:t>class</a:t>
+            </a:r>
+          </a:p>
+          <a:p>
+            <a:r>
+              <a:rPr lang="en-GB" sz="1600" dirty="0" smtClean="0">
+                <a:sym typeface="Wingdings" panose="05000000000000000000" pitchFamily="2" charset="2"/>
+              </a:rPr>
+              <a:t>Benefits:</a:t>
             </a:r>
           </a:p>
           <a:p>
@@ -9062,8 +9182,10 @@
               <a:buChar char="Ø"/>
             </a:pPr>
             <a:r>
-              <a:rPr lang="en-US" sz="1400" dirty="0" smtClean="0"/>
-              <a:t>foreach methods</a:t>
+              <a:rPr lang="en-GB" sz="1400" dirty="0" smtClean="0">
+                <a:sym typeface="Wingdings" panose="05000000000000000000" pitchFamily="2" charset="2"/>
+              </a:rPr>
+              <a:t>Thread safe</a:t>
             </a:r>
           </a:p>
           <a:p>
@@ -9072,12 +9194,22 @@
               <a:buChar char="Ø"/>
             </a:pPr>
             <a:r>
-              <a:rPr lang="en-US" sz="1400" dirty="0"/>
-              <a:t>s</a:t>
-            </a:r>
-            <a:r>
-              <a:rPr lang="en-US" sz="1400" dirty="0" smtClean="0"/>
-              <a:t>earch methods</a:t>
+              <a:rPr lang="en-GB" sz="1400" dirty="0" smtClean="0">
+                <a:sym typeface="Wingdings" panose="05000000000000000000" pitchFamily="2" charset="2"/>
+              </a:rPr>
+              <a:t>High performance because synchronization is not required</a:t>
+            </a:r>
+          </a:p>
+          <a:p>
+            <a:pPr>
+              <a:buFont typeface="Wingdings" panose="05000000000000000000" pitchFamily="2" charset="2"/>
+              <a:buChar char="Ø"/>
+            </a:pPr>
+            <a:r>
+              <a:rPr lang="en-GB" sz="1600" dirty="0" smtClean="0">
+                <a:sym typeface="Wingdings" panose="05000000000000000000" pitchFamily="2" charset="2"/>
+              </a:rPr>
+              <a:t>Disadvantages:</a:t>
             </a:r>
           </a:p>
           <a:p>
@@ -9086,106 +9218,33 @@
               <a:buChar char="Ø"/>
             </a:pPr>
             <a:r>
-              <a:rPr lang="en-US" sz="1400" dirty="0" smtClean="0"/>
-              <a:t>reduction methods</a:t>
-            </a:r>
-          </a:p>
-          <a:p>
-            <a:r>
-              <a:rPr lang="en-US" sz="1600" dirty="0" smtClean="0"/>
-              <a:t>New </a:t>
-            </a:r>
-            <a:r>
-              <a:rPr lang="en-US" sz="1600" dirty="0"/>
-              <a:t>classes in </a:t>
-            </a:r>
-            <a:r>
-              <a:rPr lang="en-US" sz="1600" dirty="0" smtClean="0"/>
-              <a:t>java.util.concurrent.atomic</a:t>
-            </a:r>
-          </a:p>
-          <a:p>
-            <a:pPr lvl="1">
-              <a:buFont typeface="Wingdings" panose="05000000000000000000" pitchFamily="2" charset="2"/>
-              <a:buChar char="Ø"/>
-            </a:pPr>
-            <a:r>
-              <a:rPr lang="en-US" sz="1400" dirty="0">
-                <a:hlinkClick r:id="rId2"/>
+              <a:rPr lang="en-GB" sz="1400" dirty="0" smtClean="0">
+                <a:sym typeface="Wingdings" panose="05000000000000000000" pitchFamily="2" charset="2"/>
               </a:rPr>
-              <a:t>DoubleAccumulator</a:t>
-            </a:r>
-            <a:endParaRPr lang="en-US" sz="1400" dirty="0"/>
-          </a:p>
-          <a:p>
-            <a:pPr lvl="1">
-              <a:buFont typeface="Wingdings" panose="05000000000000000000" pitchFamily="2" charset="2"/>
-              <a:buChar char="Ø"/>
-            </a:pPr>
-            <a:r>
-              <a:rPr lang="en-US" sz="1400" dirty="0">
-                <a:hlinkClick r:id="rId3"/>
+              <a:t>Creates heavy garbage collection</a:t>
+            </a:r>
+          </a:p>
+          <a:p>
+            <a:r>
+              <a:rPr lang="en-GB" sz="1600" dirty="0" smtClean="0">
+                <a:sym typeface="Wingdings" panose="05000000000000000000" pitchFamily="2" charset="2"/>
               </a:rPr>
-              <a:t>DoubleAdder</a:t>
-            </a:r>
-            <a:endParaRPr lang="en-US" sz="1400" dirty="0"/>
-          </a:p>
-          <a:p>
-            <a:pPr lvl="1">
-              <a:buFont typeface="Wingdings" panose="05000000000000000000" pitchFamily="2" charset="2"/>
-              <a:buChar char="Ø"/>
-            </a:pPr>
-            <a:r>
-              <a:rPr lang="en-US" sz="1400" dirty="0">
-                <a:hlinkClick r:id="rId4"/>
+              <a:t>Importance Classes:</a:t>
+            </a:r>
+          </a:p>
+          <a:p>
+            <a:pPr lvl="1"/>
+            <a:r>
+              <a:rPr lang="en-GB" sz="1400" dirty="0" smtClean="0">
+                <a:sym typeface="Wingdings" panose="05000000000000000000" pitchFamily="2" charset="2"/>
               </a:rPr>
-              <a:t>LongAccumulator</a:t>
-            </a:r>
-            <a:endParaRPr lang="en-US" sz="1400" dirty="0"/>
-          </a:p>
-          <a:p>
-            <a:pPr lvl="1">
-              <a:buFont typeface="Wingdings" panose="05000000000000000000" pitchFamily="2" charset="2"/>
-              <a:buChar char="Ø"/>
-            </a:pPr>
-            <a:r>
-              <a:rPr lang="en-US" sz="1400" dirty="0"/>
-              <a:t>LongAdder</a:t>
-            </a:r>
-          </a:p>
-          <a:p>
-            <a:r>
-              <a:rPr lang="en-US" sz="1600" dirty="0" smtClean="0"/>
-              <a:t>New </a:t>
-            </a:r>
-            <a:r>
-              <a:rPr lang="en-US" sz="1600" dirty="0"/>
-              <a:t>methods in java.util.concurrent.ForkJoinPool</a:t>
-            </a:r>
-          </a:p>
-          <a:p>
-            <a:r>
-              <a:rPr lang="en-US" sz="1600" dirty="0" smtClean="0"/>
-              <a:t>New </a:t>
-            </a:r>
-            <a:r>
-              <a:rPr lang="en-US" sz="1600" dirty="0"/>
-              <a:t>class </a:t>
-            </a:r>
-            <a:r>
-              <a:rPr lang="en-US" sz="1600" dirty="0" smtClean="0"/>
-              <a:t>java.util.concurrent.locks.StampedLock - </a:t>
-            </a:r>
-            <a:r>
-              <a:rPr lang="en-GB" sz="1600" dirty="0"/>
-              <a:t>A new StampedLock class adds a capability-based lock with three modes for controlling read/write access (writing, reading, and optimistic reading). </a:t>
-            </a:r>
-            <a:endParaRPr lang="en-US" sz="1600" dirty="0"/>
-          </a:p>
-          <a:p>
-            <a:pPr marL="0" indent="0">
-              <a:buNone/>
-            </a:pPr>
+              <a:t>String</a:t>
+            </a:r>
+            <a:endParaRPr lang="en-GB" sz="1400" dirty="0">
+              <a:sym typeface="Wingdings" panose="05000000000000000000" pitchFamily="2" charset="2"/>
+            </a:endParaRPr>
+          </a:p>
+          <a:p>
             <a:endParaRPr lang="en-US" sz="1600" dirty="0"/>
           </a:p>
         </p:txBody>
@@ -9193,7 +9252,7 @@
     </p:spTree>
     <p:extLst>
       <p:ext uri="{BB962C8B-B14F-4D97-AF65-F5344CB8AC3E}">
-        <p14:creationId xmlns:p14="http://schemas.microsoft.com/office/powerpoint/2010/main" val="1538959423"/>
+        <p14:creationId xmlns:p14="http://schemas.microsoft.com/office/powerpoint/2010/main" val="736248315"/>
       </p:ext>
     </p:extLst>
   </p:cSld>
@@ -9239,153 +9298,95 @@
         </p:nvSpPr>
         <p:spPr/>
         <p:txBody>
+          <a:bodyPr/>
+          <a:lstStyle/>
+          <a:p>
+            <a:r>
+              <a:rPr lang="en-US" b="1" dirty="0" smtClean="0"/>
+              <a:t>Fork-Join Framework</a:t>
+            </a:r>
+            <a:endParaRPr lang="en-US" dirty="0"/>
+          </a:p>
+        </p:txBody>
+      </p:sp>
+      <p:sp>
+        <p:nvSpPr>
+          <p:cNvPr id="3" name="Content Placeholder 2"/>
+          <p:cNvSpPr>
+            <a:spLocks noGrp="1"/>
+          </p:cNvSpPr>
+          <p:nvPr>
+            <p:ph idx="1"/>
+          </p:nvPr>
+        </p:nvSpPr>
+        <p:spPr/>
+        <p:txBody>
           <a:bodyPr>
             <a:normAutofit/>
           </a:bodyPr>
           <a:lstStyle/>
           <a:p>
             <a:r>
-              <a:rPr lang="en-US" dirty="0" smtClean="0"/>
-              <a:t>Future Interface</a:t>
-            </a:r>
-            <a:endParaRPr lang="en-US" dirty="0"/>
-          </a:p>
-        </p:txBody>
-      </p:sp>
-      <p:sp>
-        <p:nvSpPr>
-          <p:cNvPr id="3" name="Content Placeholder 2"/>
-          <p:cNvSpPr>
-            <a:spLocks noGrp="1"/>
-          </p:cNvSpPr>
-          <p:nvPr>
-            <p:ph idx="1"/>
-          </p:nvPr>
-        </p:nvSpPr>
-        <p:spPr/>
-        <p:txBody>
-          <a:bodyPr>
-            <a:normAutofit/>
-          </a:bodyPr>
-          <a:lstStyle/>
-          <a:p>
-            <a:r>
-              <a:rPr lang="en-GB" sz="1600" dirty="0"/>
-              <a:t>A Future represents the result of an </a:t>
-            </a:r>
-            <a:r>
-              <a:rPr lang="en-GB" sz="1600" b="1" dirty="0"/>
-              <a:t>asynchronous computation</a:t>
-            </a:r>
-            <a:r>
-              <a:rPr lang="en-GB" sz="1600" dirty="0"/>
-              <a:t>. Methods are provided to check if the computation is complete, to wait for its completion, and to retrieve the result of the computation. </a:t>
-            </a:r>
-            <a:endParaRPr lang="en-GB" sz="1600" dirty="0" smtClean="0"/>
-          </a:p>
-          <a:p>
+              <a:rPr lang="en-US" sz="1600" dirty="0" smtClean="0"/>
+              <a:t>Introduced in JDK 7 </a:t>
+            </a:r>
             <a:r>
               <a:rPr lang="en-GB" sz="1600" dirty="0" smtClean="0"/>
-              <a:t>The </a:t>
-            </a:r>
-            <a:r>
-              <a:rPr lang="en-GB" sz="1600" dirty="0"/>
-              <a:t>result can only be retrieved using </a:t>
-            </a:r>
-            <a:r>
-              <a:rPr lang="en-GB" sz="1600" b="1" dirty="0"/>
-              <a:t>method get </a:t>
-            </a:r>
-            <a:r>
-              <a:rPr lang="en-GB" sz="1600" dirty="0"/>
-              <a:t>when the computation has completed, blocking if necessary until it is ready. Cancellation is performed by the </a:t>
-            </a:r>
-            <a:r>
-              <a:rPr lang="en-GB" sz="1600" b="1" dirty="0"/>
-              <a:t>cancel method</a:t>
-            </a:r>
-            <a:r>
-              <a:rPr lang="en-GB" sz="1600" dirty="0"/>
-              <a:t>. Additional methods are provided to determine if the task completed normally or was cancelled. Once a computation has completed, the computation cannot be cancelled. If you would like to use a Future for the sake of cancellability but not provide a usable result, you can declare types of the form Future&lt;?&gt; </a:t>
+              <a:t>to </a:t>
+            </a:r>
+            <a:r>
+              <a:rPr lang="en-GB" sz="1600" dirty="0"/>
+              <a:t>take advantage of multiple processors of modern day </a:t>
             </a:r>
             <a:r>
               <a:rPr lang="en-GB" sz="1600" dirty="0" smtClean="0"/>
-              <a:t>and </a:t>
-            </a:r>
-            <a:r>
-              <a:rPr lang="en-GB" sz="1600" dirty="0"/>
-              <a:t>return null as a result of the underlying task</a:t>
+              <a:t>servers</a:t>
+            </a:r>
+          </a:p>
+          <a:p>
+            <a:r>
+              <a:rPr lang="en-GB" sz="1600" dirty="0"/>
+              <a:t>It is designed for work that can be broken into smaller pieces recursively. The goal is to use all the available processing power to enhance the performance of your </a:t>
             </a:r>
             <a:r>
               <a:rPr lang="en-GB" sz="1600" dirty="0" smtClean="0"/>
-              <a:t>.</a:t>
-            </a:r>
+              <a:t>application</a:t>
+            </a:r>
+            <a:endParaRPr lang="en-GB" sz="1600" dirty="0"/>
           </a:p>
           <a:p>
             <a:r>
               <a:rPr lang="en-GB" sz="1600" dirty="0" smtClean="0"/>
-              <a:t>Sub interfaces:-</a:t>
-            </a:r>
-          </a:p>
-          <a:p>
-            <a:pPr lvl="1"/>
-            <a:r>
-              <a:rPr lang="en-GB" sz="1400" dirty="0" smtClean="0"/>
-              <a:t>Response&lt;T&gt;</a:t>
-            </a:r>
-          </a:p>
-          <a:p>
-            <a:pPr lvl="1"/>
-            <a:r>
-              <a:rPr lang="en-GB" sz="1400" dirty="0" err="1" smtClean="0"/>
-              <a:t>RunnableFuture</a:t>
-            </a:r>
-            <a:r>
-              <a:rPr lang="en-GB" sz="1400" dirty="0" smtClean="0"/>
-              <a:t>&lt;V&gt;</a:t>
-            </a:r>
-          </a:p>
-          <a:p>
-            <a:pPr lvl="1"/>
-            <a:r>
-              <a:rPr lang="en-GB" sz="1400" dirty="0" err="1"/>
-              <a:t>RunnableScheduledFuture</a:t>
-            </a:r>
-            <a:r>
-              <a:rPr lang="en-GB" sz="1400" dirty="0"/>
-              <a:t>&lt;V</a:t>
-            </a:r>
-            <a:r>
-              <a:rPr lang="en-GB" sz="1400" dirty="0" smtClean="0"/>
-              <a:t>&gt;</a:t>
-            </a:r>
-          </a:p>
-          <a:p>
-            <a:pPr lvl="1"/>
-            <a:r>
-              <a:rPr lang="en-GB" sz="1400" dirty="0"/>
-              <a:t> </a:t>
-            </a:r>
-            <a:r>
-              <a:rPr lang="en-GB" sz="1400" dirty="0" err="1"/>
-              <a:t>ScheduledFuture</a:t>
-            </a:r>
-            <a:r>
-              <a:rPr lang="en-GB" sz="1400" dirty="0"/>
-              <a:t>&lt;V&gt;</a:t>
-            </a:r>
-            <a:endParaRPr lang="en-GB" sz="1400" dirty="0" smtClean="0"/>
-          </a:p>
-          <a:p>
-            <a:pPr lvl="1"/>
-            <a:endParaRPr lang="en-US" sz="1200" dirty="0"/>
+              <a:t>It uses </a:t>
+            </a:r>
+            <a:r>
+              <a:rPr lang="en-US" sz="1600" dirty="0"/>
+              <a:t>work-stealing </a:t>
+            </a:r>
+            <a:r>
+              <a:rPr lang="en-US" sz="1600" dirty="0" smtClean="0"/>
+              <a:t>algorithm</a:t>
+            </a:r>
+          </a:p>
+          <a:p>
+            <a:r>
+              <a:rPr lang="en-GB" sz="1600" dirty="0"/>
+              <a:t>Worker threads that run out of things to do can steal tasks from other threads that are still </a:t>
+            </a:r>
+            <a:r>
+              <a:rPr lang="en-GB" sz="1600" dirty="0" smtClean="0"/>
+              <a:t>busy</a:t>
+            </a:r>
+            <a:endParaRPr lang="en-GB" sz="1600" dirty="0">
+              <a:sym typeface="Wingdings" panose="05000000000000000000" pitchFamily="2" charset="2"/>
+            </a:endParaRPr>
           </a:p>
         </p:txBody>
       </p:sp>
     </p:spTree>
     <p:extLst>
       <p:ext uri="{BB962C8B-B14F-4D97-AF65-F5344CB8AC3E}">
-        <p14:creationId xmlns:p14="http://schemas.microsoft.com/office/powerpoint/2010/main" val="524333974"/>
+        <p14:creationId xmlns:p14="http://schemas.microsoft.com/office/powerpoint/2010/main" val="3656992556"/>
       </p:ext>
     </p:extLst>
   </p:cSld>
@@ -9432,13 +9433,13 @@
         <p:spPr/>
         <p:txBody>
           <a:bodyPr>
-            <a:normAutofit/>
+            <a:normAutofit fontScale="90000"/>
           </a:bodyPr>
           <a:lstStyle/>
           <a:p>
             <a:r>
-              <a:rPr lang="en-US" dirty="0" smtClean="0"/>
-              <a:t>Callable – Functional Interface</a:t>
+              <a:rPr lang="en-US" b="1" dirty="0" smtClean="0"/>
+              <a:t>Java 8 Concurrency Improvements</a:t>
             </a:r>
             <a:endParaRPr lang="en-US" dirty="0"/>
           </a:p>
@@ -9463,78 +9464,149 @@
           <a:p>
             <a:r>
               <a:rPr lang="en-GB" sz="1600" dirty="0"/>
-              <a:t>This is a functional interface and can therefore be used as the assignment target for a lambda expression or method </a:t>
-            </a:r>
-            <a:r>
-              <a:rPr lang="en-GB" sz="1600" dirty="0" smtClean="0"/>
-              <a:t>reference</a:t>
-            </a:r>
-          </a:p>
-          <a:p>
-            <a:r>
-              <a:rPr lang="en-GB" sz="1600" dirty="0"/>
-              <a:t>A task that returns a result and may throw an exception. </a:t>
-            </a:r>
-            <a:r>
-              <a:rPr lang="en-GB" sz="1600" dirty="0" err="1"/>
-              <a:t>Implementors</a:t>
-            </a:r>
-            <a:r>
-              <a:rPr lang="en-GB" sz="1600" dirty="0"/>
-              <a:t> define a single method with no arguments called </a:t>
-            </a:r>
-            <a:r>
-              <a:rPr lang="en-GB" sz="1600" b="1" dirty="0"/>
-              <a:t>call</a:t>
-            </a:r>
-            <a:r>
-              <a:rPr lang="en-GB" sz="1600" dirty="0" smtClean="0"/>
-              <a:t>.</a:t>
-            </a:r>
-          </a:p>
-          <a:p>
-            <a:r>
-              <a:rPr lang="en-GB" sz="1600" dirty="0"/>
-              <a:t>The Callable interface is similar to </a:t>
-            </a:r>
-            <a:r>
-              <a:rPr lang="en-GB" sz="1600" dirty="0">
-                <a:hlinkClick r:id="rId2" tooltip="interface in java.lang"/>
+              <a:t>New classes and interfaces in java.util.concurrent</a:t>
+            </a:r>
+          </a:p>
+          <a:p>
+            <a:r>
+              <a:rPr lang="en-US" sz="1600" dirty="0"/>
+              <a:t>New methods in </a:t>
+            </a:r>
+            <a:r>
+              <a:rPr lang="en-US" sz="1600" dirty="0" smtClean="0"/>
+              <a:t>java.util.concurrent.ConcurrentHashMap</a:t>
+            </a:r>
+          </a:p>
+          <a:p>
+            <a:pPr lvl="1">
+              <a:buFont typeface="Wingdings" panose="05000000000000000000" pitchFamily="2" charset="2"/>
+              <a:buChar char="Ø"/>
+            </a:pPr>
+            <a:r>
+              <a:rPr lang="en-US" sz="1400" dirty="0" smtClean="0"/>
+              <a:t>foreach methods</a:t>
+            </a:r>
+          </a:p>
+          <a:p>
+            <a:pPr lvl="1">
+              <a:buFont typeface="Wingdings" panose="05000000000000000000" pitchFamily="2" charset="2"/>
+              <a:buChar char="Ø"/>
+            </a:pPr>
+            <a:r>
+              <a:rPr lang="en-US" sz="1400" dirty="0"/>
+              <a:t>s</a:t>
+            </a:r>
+            <a:r>
+              <a:rPr lang="en-US" sz="1400" dirty="0" smtClean="0"/>
+              <a:t>earch methods</a:t>
+            </a:r>
+          </a:p>
+          <a:p>
+            <a:pPr lvl="1">
+              <a:buFont typeface="Wingdings" panose="05000000000000000000" pitchFamily="2" charset="2"/>
+              <a:buChar char="Ø"/>
+            </a:pPr>
+            <a:r>
+              <a:rPr lang="en-US" sz="1400" dirty="0" smtClean="0"/>
+              <a:t>reduction methods</a:t>
+            </a:r>
+          </a:p>
+          <a:p>
+            <a:r>
+              <a:rPr lang="en-US" sz="1600" dirty="0" smtClean="0"/>
+              <a:t>New </a:t>
+            </a:r>
+            <a:r>
+              <a:rPr lang="en-US" sz="1600" dirty="0"/>
+              <a:t>classes in </a:t>
+            </a:r>
+            <a:r>
+              <a:rPr lang="en-US" sz="1600" dirty="0" smtClean="0"/>
+              <a:t>java.util.concurrent.atomic</a:t>
+            </a:r>
+          </a:p>
+          <a:p>
+            <a:pPr lvl="1">
+              <a:buFont typeface="Wingdings" panose="05000000000000000000" pitchFamily="2" charset="2"/>
+              <a:buChar char="Ø"/>
+            </a:pPr>
+            <a:r>
+              <a:rPr lang="en-US" sz="1400" dirty="0">
+                <a:hlinkClick r:id="rId2"/>
               </a:rPr>
-              <a:t>Runnable</a:t>
-            </a:r>
-            <a:r>
-              <a:rPr lang="en-GB" sz="1600" dirty="0"/>
-              <a:t>, in that both are designed for classes whose instances are potentially executed by another thread. </a:t>
-            </a:r>
-            <a:r>
-              <a:rPr lang="en-GB" sz="1600" dirty="0">
-                <a:solidFill>
-                  <a:srgbClr val="FF0000"/>
-                </a:solidFill>
+              <a:t>DoubleAccumulator</a:t>
+            </a:r>
+            <a:endParaRPr lang="en-US" sz="1400" dirty="0"/>
+          </a:p>
+          <a:p>
+            <a:pPr lvl="1">
+              <a:buFont typeface="Wingdings" panose="05000000000000000000" pitchFamily="2" charset="2"/>
+              <a:buChar char="Ø"/>
+            </a:pPr>
+            <a:r>
+              <a:rPr lang="en-US" sz="1400" dirty="0">
+                <a:hlinkClick r:id="rId3"/>
               </a:rPr>
-              <a:t>A Runnable, however, does not return a result and cannot throw a checked exception</a:t>
-            </a:r>
-            <a:r>
-              <a:rPr lang="en-GB" sz="1600" dirty="0" smtClean="0"/>
-              <a:t>.</a:t>
-            </a:r>
-          </a:p>
-          <a:p>
-            <a:r>
-              <a:rPr lang="en-GB" sz="1600" dirty="0"/>
-              <a:t>The </a:t>
-            </a:r>
-            <a:r>
-              <a:rPr lang="en-GB" sz="1600" dirty="0">
-                <a:hlinkClick r:id="rId3" tooltip="class in java.util.concurrent"/>
+              <a:t>DoubleAdder</a:t>
+            </a:r>
+            <a:endParaRPr lang="en-US" sz="1400" dirty="0"/>
+          </a:p>
+          <a:p>
+            <a:pPr lvl="1">
+              <a:buFont typeface="Wingdings" panose="05000000000000000000" pitchFamily="2" charset="2"/>
+              <a:buChar char="Ø"/>
+            </a:pPr>
+            <a:r>
+              <a:rPr lang="en-US" sz="1400" dirty="0">
+                <a:hlinkClick r:id="rId4"/>
               </a:rPr>
-              <a:t>Executors</a:t>
-            </a:r>
-            <a:r>
-              <a:rPr lang="en-GB" sz="1600" dirty="0"/>
-              <a:t> class contains utility methods to convert from other common forms to Callable classes.</a:t>
-            </a:r>
+              <a:t>LongAccumulator</a:t>
+            </a:r>
+            <a:endParaRPr lang="en-US" sz="1400" dirty="0"/>
+          </a:p>
+          <a:p>
+            <a:pPr lvl="1">
+              <a:buFont typeface="Wingdings" panose="05000000000000000000" pitchFamily="2" charset="2"/>
+              <a:buChar char="Ø"/>
+            </a:pPr>
+            <a:r>
+              <a:rPr lang="en-US" sz="1400" dirty="0"/>
+              <a:t>LongAdder</a:t>
+            </a:r>
+          </a:p>
+          <a:p>
+            <a:r>
+              <a:rPr lang="en-US" sz="1600" dirty="0" smtClean="0"/>
+              <a:t>New </a:t>
+            </a:r>
+            <a:r>
+              <a:rPr lang="en-US" sz="1600" dirty="0"/>
+              <a:t>methods in java.util.concurrent.ForkJoinPool</a:t>
+            </a:r>
+          </a:p>
+          <a:p>
+            <a:r>
+              <a:rPr lang="en-US" sz="1600" dirty="0" smtClean="0"/>
+              <a:t>New </a:t>
+            </a:r>
+            <a:r>
+              <a:rPr lang="en-US" sz="1600" dirty="0"/>
+              <a:t>class </a:t>
+            </a:r>
+            <a:r>
+              <a:rPr lang="en-US" sz="1600" dirty="0" smtClean="0"/>
+              <a:t>java.util.concurrent.locks.StampedLock - </a:t>
+            </a:r>
+            <a:r>
+              <a:rPr lang="en-GB" sz="1600" dirty="0"/>
+              <a:t>A new StampedLock class adds a capability-based lock with three modes for controlling read/write access (writing, reading, and optimistic reading). </a:t>
+            </a:r>
+            <a:endParaRPr lang="en-US" sz="1600" dirty="0"/>
+          </a:p>
+          <a:p>
+            <a:pPr marL="0" indent="0">
+              <a:buNone/>
+            </a:pPr>
             <a:endParaRPr lang="en-US" sz="1600" dirty="0"/>
           </a:p>
         </p:txBody>
@@ -9542,7 +9614,7 @@
     </p:spTree>
     <p:extLst>
       <p:ext uri="{BB962C8B-B14F-4D97-AF65-F5344CB8AC3E}">
-        <p14:creationId xmlns:p14="http://schemas.microsoft.com/office/powerpoint/2010/main" val="4097504239"/>
+        <p14:creationId xmlns:p14="http://schemas.microsoft.com/office/powerpoint/2010/main" val="1538959423"/>
       </p:ext>
     </p:extLst>
   </p:cSld>
@@ -9594,8 +9666,8 @@
           <a:lstStyle/>
           <a:p>
             <a:r>
-              <a:rPr lang="en-GB" dirty="0" smtClean="0"/>
-              <a:t>CompletableFuture</a:t>
+              <a:rPr lang="en-US" dirty="0" smtClean="0"/>
+              <a:t>Future Interface</a:t>
             </a:r>
             <a:endParaRPr lang="en-US" dirty="0"/>
           </a:p>
@@ -9620,15 +9692,50 @@
           <a:p>
             <a:r>
               <a:rPr lang="en-GB" sz="1600" dirty="0"/>
-              <a:t>CompletableFuture is used for asynchronous programming in Java. Asynchronous programming is a means of writing </a:t>
-            </a:r>
-            <a:r>
-              <a:rPr lang="en-GB" sz="1600" i="1" dirty="0"/>
-              <a:t>non-blocking</a:t>
-            </a:r>
-            <a:r>
-              <a:rPr lang="en-GB" sz="1600" dirty="0"/>
-              <a:t> code by running a task on a separate thread than the main application thread and notifying the main thread about its progress, completion or failure</a:t>
+              <a:t>A Future represents the result of an </a:t>
+            </a:r>
+            <a:r>
+              <a:rPr lang="en-GB" sz="1600" b="1" dirty="0"/>
+              <a:t>asynchronous computation</a:t>
+            </a:r>
+            <a:r>
+              <a:rPr lang="en-GB" sz="1600" dirty="0"/>
+              <a:t>. Methods are provided to check if the computation is complete, to wait for its completion, and to retrieve the result of the computation. </a:t>
+            </a:r>
+            <a:endParaRPr lang="en-GB" sz="1600" dirty="0" smtClean="0"/>
+          </a:p>
+          <a:p>
+            <a:r>
+              <a:rPr lang="en-GB" sz="1600" dirty="0" smtClean="0"/>
+              <a:t>The </a:t>
+            </a:r>
+            <a:r>
+              <a:rPr lang="en-GB" sz="1600" dirty="0"/>
+              <a:t>result can only be retrieved using </a:t>
+            </a:r>
+            <a:r>
+              <a:rPr lang="en-GB" sz="1600" b="1" dirty="0"/>
+              <a:t>method get </a:t>
+            </a:r>
+            <a:r>
+              <a:rPr lang="en-GB" sz="1600" dirty="0"/>
+              <a:t>when the computation has completed, blocking if necessary until it is ready. Cancellation is performed by the </a:t>
+            </a:r>
+            <a:r>
+              <a:rPr lang="en-GB" sz="1600" b="1" dirty="0"/>
+              <a:t>cancel method</a:t>
+            </a:r>
+            <a:r>
+              <a:rPr lang="en-GB" sz="1600" dirty="0"/>
+              <a:t>. Additional methods are provided to determine if the task completed normally or was cancelled. Once a computation has completed, the computation cannot be cancelled. If you would like to use a Future for the sake of cancellability but not provide a usable result, you can declare types of the form Future&lt;?&gt; </a:t>
+            </a:r>
+            <a:r>
+              <a:rPr lang="en-GB" sz="1600" dirty="0" smtClean="0"/>
+              <a:t>and </a:t>
+            </a:r>
+            <a:r>
+              <a:rPr lang="en-GB" sz="1600" dirty="0"/>
+              <a:t>return null as a result of the underlying task</a:t>
             </a:r>
             <a:r>
               <a:rPr lang="en-GB" sz="1600" dirty="0" smtClean="0"/>
@@ -9638,106 +9745,68 @@
           <a:p>
             <a:r>
               <a:rPr lang="en-GB" sz="1600" dirty="0" smtClean="0"/>
-              <a:t>Limitations of Future:-</a:t>
-            </a:r>
-          </a:p>
-          <a:p>
-            <a:pPr lvl="1">
-              <a:buFont typeface="Wingdings" panose="05000000000000000000" pitchFamily="2" charset="2"/>
-              <a:buChar char="Ø"/>
-            </a:pPr>
+              <a:t>Sub interfaces:-</a:t>
+            </a:r>
+          </a:p>
+          <a:p>
+            <a:pPr lvl="1"/>
             <a:r>
               <a:rPr lang="en-GB" sz="1400" dirty="0" smtClean="0"/>
-              <a:t>It cannot be manually completed</a:t>
-            </a:r>
-          </a:p>
-          <a:p>
-            <a:pPr lvl="1">
-              <a:buFont typeface="Wingdings" panose="05000000000000000000" pitchFamily="2" charset="2"/>
-              <a:buChar char="Ø"/>
-            </a:pPr>
+              <a:t>Response&lt;T&gt;</a:t>
+            </a:r>
+          </a:p>
+          <a:p>
+            <a:pPr lvl="1"/>
+            <a:r>
+              <a:rPr lang="en-GB" sz="1400" dirty="0" err="1" smtClean="0"/>
+              <a:t>RunnableFuture</a:t>
+            </a:r>
+            <a:r>
+              <a:rPr lang="en-GB" sz="1400" dirty="0" smtClean="0"/>
+              <a:t>&lt;V&gt;</a:t>
+            </a:r>
+          </a:p>
+          <a:p>
+            <a:pPr lvl="1"/>
+            <a:r>
+              <a:rPr lang="en-GB" sz="1400" dirty="0" err="1"/>
+              <a:t>RunnableScheduledFuture</a:t>
+            </a:r>
             <a:r>
               <a:rPr lang="en-GB" sz="1400" dirty="0"/>
-              <a:t>You cannot perform further action on a Future’s result without </a:t>
+              <a:t>&lt;V</a:t>
             </a:r>
             <a:r>
               <a:rPr lang="en-GB" sz="1400" dirty="0" smtClean="0"/>
-              <a:t>blocking. The get() method is a blocking method. </a:t>
-            </a:r>
+              <a:t>&gt;</a:t>
+            </a:r>
+          </a:p>
+          <a:p>
+            <a:pPr lvl="1"/>
             <a:r>
               <a:rPr lang="en-GB" sz="1400" dirty="0"/>
-              <a:t>You </a:t>
-            </a:r>
-            <a:r>
-              <a:rPr lang="en-GB" sz="1400" b="1" dirty="0">
-                <a:solidFill>
-                  <a:srgbClr val="FF0000"/>
-                </a:solidFill>
-              </a:rPr>
-              <a:t>don’t have the ability to attach a </a:t>
-            </a:r>
-            <a:r>
-              <a:rPr lang="en-GB" sz="1400" b="1" dirty="0" err="1">
-                <a:solidFill>
-                  <a:srgbClr val="FF0000"/>
-                </a:solidFill>
-              </a:rPr>
-              <a:t>callback</a:t>
-            </a:r>
-            <a:r>
-              <a:rPr lang="en-GB" sz="1400" b="1" dirty="0">
-                <a:solidFill>
-                  <a:srgbClr val="FF0000"/>
-                </a:solidFill>
-              </a:rPr>
-              <a:t> function </a:t>
+              <a:t> </a:t>
+            </a:r>
+            <a:r>
+              <a:rPr lang="en-GB" sz="1400" dirty="0" err="1"/>
+              <a:t>ScheduledFuture</a:t>
             </a:r>
             <a:r>
               <a:rPr lang="en-GB" sz="1400" dirty="0"/>
-              <a:t>to the Future and have it get called automatically when the Future’s result is available</a:t>
-            </a:r>
-            <a:r>
-              <a:rPr lang="en-GB" sz="1400" dirty="0" smtClean="0"/>
-              <a:t>.</a:t>
-            </a:r>
-          </a:p>
-          <a:p>
-            <a:pPr lvl="1">
-              <a:buFont typeface="Wingdings" panose="05000000000000000000" pitchFamily="2" charset="2"/>
-              <a:buChar char="Ø"/>
-            </a:pPr>
-            <a:r>
-              <a:rPr lang="en-GB" sz="1400" dirty="0" smtClean="0"/>
-              <a:t>Multiple futures cannot be chained together</a:t>
-            </a:r>
-          </a:p>
-          <a:p>
-            <a:pPr lvl="1">
-              <a:buFont typeface="Wingdings" panose="05000000000000000000" pitchFamily="2" charset="2"/>
-              <a:buChar char="Ø"/>
-            </a:pPr>
-            <a:r>
-              <a:rPr lang="en-GB" sz="1400" dirty="0" smtClean="0"/>
-              <a:t>You cannot combine multiple futures together</a:t>
-            </a:r>
-          </a:p>
-          <a:p>
-            <a:pPr lvl="1">
-              <a:buFont typeface="Wingdings" panose="05000000000000000000" pitchFamily="2" charset="2"/>
-              <a:buChar char="Ø"/>
-            </a:pPr>
-            <a:r>
-              <a:rPr lang="en-GB" sz="1400" dirty="0" smtClean="0"/>
-              <a:t>No exception handling</a:t>
-            </a:r>
-            <a:endParaRPr lang="en-US" sz="1400" dirty="0"/>
+              <a:t>&lt;V&gt;</a:t>
+            </a:r>
+            <a:endParaRPr lang="en-GB" sz="1400" dirty="0" smtClean="0"/>
+          </a:p>
+          <a:p>
+            <a:pPr lvl="1"/>
+            <a:endParaRPr lang="en-US" sz="1200" dirty="0"/>
           </a:p>
         </p:txBody>
       </p:sp>
     </p:spTree>
     <p:extLst>
       <p:ext uri="{BB962C8B-B14F-4D97-AF65-F5344CB8AC3E}">
-        <p14:creationId xmlns:p14="http://schemas.microsoft.com/office/powerpoint/2010/main" val="1972032369"/>
+        <p14:creationId xmlns:p14="http://schemas.microsoft.com/office/powerpoint/2010/main" val="524333974"/>
       </p:ext>
     </p:extLst>
   </p:cSld>
@@ -9783,6 +9852,824 @@
         </p:nvSpPr>
         <p:spPr/>
         <p:txBody>
+          <a:bodyPr>
+            <a:normAutofit/>
+          </a:bodyPr>
+          <a:lstStyle/>
+          <a:p>
+            <a:r>
+              <a:rPr lang="en-US" dirty="0" smtClean="0"/>
+              <a:t>Callable – Functional Interface</a:t>
+            </a:r>
+            <a:endParaRPr lang="en-US" dirty="0"/>
+          </a:p>
+        </p:txBody>
+      </p:sp>
+      <p:sp>
+        <p:nvSpPr>
+          <p:cNvPr id="3" name="Content Placeholder 2"/>
+          <p:cNvSpPr>
+            <a:spLocks noGrp="1"/>
+          </p:cNvSpPr>
+          <p:nvPr>
+            <p:ph idx="1"/>
+          </p:nvPr>
+        </p:nvSpPr>
+        <p:spPr/>
+        <p:txBody>
+          <a:bodyPr>
+            <a:normAutofit/>
+          </a:bodyPr>
+          <a:lstStyle/>
+          <a:p>
+            <a:r>
+              <a:rPr lang="en-GB" sz="1600" dirty="0"/>
+              <a:t>This is a functional interface and can therefore be used as the assignment target for a lambda expression or method </a:t>
+            </a:r>
+            <a:r>
+              <a:rPr lang="en-GB" sz="1600" dirty="0" smtClean="0"/>
+              <a:t>reference</a:t>
+            </a:r>
+          </a:p>
+          <a:p>
+            <a:r>
+              <a:rPr lang="en-GB" sz="1600" dirty="0"/>
+              <a:t>A task that returns a result and may throw an exception. </a:t>
+            </a:r>
+            <a:r>
+              <a:rPr lang="en-GB" sz="1600" dirty="0" err="1"/>
+              <a:t>Implementors</a:t>
+            </a:r>
+            <a:r>
+              <a:rPr lang="en-GB" sz="1600" dirty="0"/>
+              <a:t> define a single method with no arguments called </a:t>
+            </a:r>
+            <a:r>
+              <a:rPr lang="en-GB" sz="1600" b="1" dirty="0"/>
+              <a:t>call</a:t>
+            </a:r>
+            <a:r>
+              <a:rPr lang="en-GB" sz="1600" dirty="0" smtClean="0"/>
+              <a:t>.</a:t>
+            </a:r>
+          </a:p>
+          <a:p>
+            <a:r>
+              <a:rPr lang="en-GB" sz="1600" dirty="0"/>
+              <a:t>The Callable interface is similar to </a:t>
+            </a:r>
+            <a:r>
+              <a:rPr lang="en-GB" sz="1600" dirty="0">
+                <a:hlinkClick r:id="rId2" tooltip="interface in java.lang"/>
+              </a:rPr>
+              <a:t>Runnable</a:t>
+            </a:r>
+            <a:r>
+              <a:rPr lang="en-GB" sz="1600" dirty="0"/>
+              <a:t>, in that both are designed for classes whose instances are potentially executed by another thread. </a:t>
+            </a:r>
+            <a:r>
+              <a:rPr lang="en-GB" sz="1600" dirty="0">
+                <a:solidFill>
+                  <a:srgbClr val="FF0000"/>
+                </a:solidFill>
+              </a:rPr>
+              <a:t>A Runnable, however, does not return a result and cannot throw a checked exception</a:t>
+            </a:r>
+            <a:r>
+              <a:rPr lang="en-GB" sz="1600" dirty="0" smtClean="0"/>
+              <a:t>.</a:t>
+            </a:r>
+          </a:p>
+          <a:p>
+            <a:r>
+              <a:rPr lang="en-GB" sz="1600" dirty="0"/>
+              <a:t>The </a:t>
+            </a:r>
+            <a:r>
+              <a:rPr lang="en-GB" sz="1600" dirty="0">
+                <a:hlinkClick r:id="rId3" tooltip="class in java.util.concurrent"/>
+              </a:rPr>
+              <a:t>Executors</a:t>
+            </a:r>
+            <a:r>
+              <a:rPr lang="en-GB" sz="1600" dirty="0"/>
+              <a:t> class contains utility methods to convert from other common forms to Callable classes.</a:t>
+            </a:r>
+            <a:endParaRPr lang="en-US" sz="1600" dirty="0"/>
+          </a:p>
+        </p:txBody>
+      </p:sp>
+    </p:spTree>
+    <p:extLst>
+      <p:ext uri="{BB962C8B-B14F-4D97-AF65-F5344CB8AC3E}">
+        <p14:creationId xmlns:p14="http://schemas.microsoft.com/office/powerpoint/2010/main" val="4097504239"/>
+      </p:ext>
+    </p:extLst>
+  </p:cSld>
+  <p:clrMapOvr>
+    <a:masterClrMapping/>
+  </p:clrMapOvr>
+  <p:timing>
+    <p:tnLst>
+      <p:par>
+        <p:cTn id="1" dur="indefinite" restart="never" nodeType="tmRoot"/>
+      </p:par>
+    </p:tnLst>
+  </p:timing>
+</p:sld>
+</file>
+
+<file path=ppt/slides/slide45.xml><?xml version="1.0" encoding="utf-8"?>
+<p:sld xmlns:a="http://schemas.openxmlformats.org/drawingml/2006/main" xmlns:r="http://schemas.openxmlformats.org/officeDocument/2006/relationships" xmlns:p="http://schemas.openxmlformats.org/presentationml/2006/main">
+  <p:cSld>
+    <p:spTree>
+      <p:nvGrpSpPr>
+        <p:cNvPr id="1" name=""/>
+        <p:cNvGrpSpPr/>
+        <p:nvPr/>
+      </p:nvGrpSpPr>
+      <p:grpSpPr>
+        <a:xfrm>
+          <a:off x="0" y="0"/>
+          <a:ext cx="0" cy="0"/>
+          <a:chOff x="0" y="0"/>
+          <a:chExt cx="0" cy="0"/>
+        </a:xfrm>
+      </p:grpSpPr>
+      <p:sp>
+        <p:nvSpPr>
+          <p:cNvPr id="2" name="Title 1"/>
+          <p:cNvSpPr>
+            <a:spLocks noGrp="1"/>
+          </p:cNvSpPr>
+          <p:nvPr>
+            <p:ph type="title"/>
+          </p:nvPr>
+        </p:nvSpPr>
+        <p:spPr/>
+        <p:txBody>
+          <a:bodyPr>
+            <a:normAutofit/>
+          </a:bodyPr>
+          <a:lstStyle/>
+          <a:p>
+            <a:r>
+              <a:rPr lang="en-GB" dirty="0" smtClean="0"/>
+              <a:t>CompletableFuture</a:t>
+            </a:r>
+            <a:endParaRPr lang="en-US" dirty="0"/>
+          </a:p>
+        </p:txBody>
+      </p:sp>
+      <p:sp>
+        <p:nvSpPr>
+          <p:cNvPr id="3" name="Content Placeholder 2"/>
+          <p:cNvSpPr>
+            <a:spLocks noGrp="1"/>
+          </p:cNvSpPr>
+          <p:nvPr>
+            <p:ph idx="1"/>
+          </p:nvPr>
+        </p:nvSpPr>
+        <p:spPr/>
+        <p:txBody>
+          <a:bodyPr>
+            <a:normAutofit/>
+          </a:bodyPr>
+          <a:lstStyle/>
+          <a:p>
+            <a:r>
+              <a:rPr lang="en-GB" sz="1600" dirty="0"/>
+              <a:t>CompletableFuture is used for asynchronous programming in Java. Asynchronous programming is a means of writing </a:t>
+            </a:r>
+            <a:r>
+              <a:rPr lang="en-GB" sz="1600" i="1" dirty="0"/>
+              <a:t>non-blocking</a:t>
+            </a:r>
+            <a:r>
+              <a:rPr lang="en-GB" sz="1600" dirty="0"/>
+              <a:t> code by running a task on a separate thread than the main application thread and notifying the main thread about its progress, completion or failure</a:t>
+            </a:r>
+            <a:r>
+              <a:rPr lang="en-GB" sz="1600" dirty="0" smtClean="0"/>
+              <a:t>.</a:t>
+            </a:r>
+          </a:p>
+          <a:p>
+            <a:r>
+              <a:rPr lang="en-GB" sz="1600" dirty="0" smtClean="0"/>
+              <a:t>Limitations of Future:-</a:t>
+            </a:r>
+          </a:p>
+          <a:p>
+            <a:pPr lvl="1">
+              <a:buFont typeface="Wingdings" panose="05000000000000000000" pitchFamily="2" charset="2"/>
+              <a:buChar char="Ø"/>
+            </a:pPr>
+            <a:r>
+              <a:rPr lang="en-GB" sz="1400" dirty="0" smtClean="0"/>
+              <a:t>It cannot be manually completed</a:t>
+            </a:r>
+          </a:p>
+          <a:p>
+            <a:pPr lvl="1">
+              <a:buFont typeface="Wingdings" panose="05000000000000000000" pitchFamily="2" charset="2"/>
+              <a:buChar char="Ø"/>
+            </a:pPr>
+            <a:r>
+              <a:rPr lang="en-GB" sz="1400" dirty="0"/>
+              <a:t>You cannot perform further action on a Future’s result without </a:t>
+            </a:r>
+            <a:r>
+              <a:rPr lang="en-GB" sz="1400" dirty="0" smtClean="0"/>
+              <a:t>blocking. The get() method is a blocking method. </a:t>
+            </a:r>
+            <a:r>
+              <a:rPr lang="en-GB" sz="1400" dirty="0"/>
+              <a:t>You </a:t>
+            </a:r>
+            <a:r>
+              <a:rPr lang="en-GB" sz="1400" b="1" dirty="0">
+                <a:solidFill>
+                  <a:srgbClr val="FF0000"/>
+                </a:solidFill>
+              </a:rPr>
+              <a:t>don’t have the ability to attach a </a:t>
+            </a:r>
+            <a:r>
+              <a:rPr lang="en-GB" sz="1400" b="1" dirty="0" err="1">
+                <a:solidFill>
+                  <a:srgbClr val="FF0000"/>
+                </a:solidFill>
+              </a:rPr>
+              <a:t>callback</a:t>
+            </a:r>
+            <a:r>
+              <a:rPr lang="en-GB" sz="1400" b="1" dirty="0">
+                <a:solidFill>
+                  <a:srgbClr val="FF0000"/>
+                </a:solidFill>
+              </a:rPr>
+              <a:t> function </a:t>
+            </a:r>
+            <a:r>
+              <a:rPr lang="en-GB" sz="1400" dirty="0"/>
+              <a:t>to the Future and have it get called automatically when the Future’s result is available</a:t>
+            </a:r>
+            <a:r>
+              <a:rPr lang="en-GB" sz="1400" dirty="0" smtClean="0"/>
+              <a:t>.</a:t>
+            </a:r>
+          </a:p>
+          <a:p>
+            <a:pPr lvl="1">
+              <a:buFont typeface="Wingdings" panose="05000000000000000000" pitchFamily="2" charset="2"/>
+              <a:buChar char="Ø"/>
+            </a:pPr>
+            <a:r>
+              <a:rPr lang="en-GB" sz="1400" dirty="0" smtClean="0"/>
+              <a:t>Multiple futures cannot be chained together</a:t>
+            </a:r>
+          </a:p>
+          <a:p>
+            <a:pPr lvl="1">
+              <a:buFont typeface="Wingdings" panose="05000000000000000000" pitchFamily="2" charset="2"/>
+              <a:buChar char="Ø"/>
+            </a:pPr>
+            <a:r>
+              <a:rPr lang="en-GB" sz="1400" dirty="0" smtClean="0"/>
+              <a:t>You cannot combine multiple futures together</a:t>
+            </a:r>
+          </a:p>
+          <a:p>
+            <a:pPr lvl="1">
+              <a:buFont typeface="Wingdings" panose="05000000000000000000" pitchFamily="2" charset="2"/>
+              <a:buChar char="Ø"/>
+            </a:pPr>
+            <a:r>
+              <a:rPr lang="en-GB" sz="1400" dirty="0" smtClean="0"/>
+              <a:t>No exception handling</a:t>
+            </a:r>
+            <a:endParaRPr lang="en-US" sz="1400" dirty="0"/>
+          </a:p>
+        </p:txBody>
+      </p:sp>
+    </p:spTree>
+    <p:extLst>
+      <p:ext uri="{BB962C8B-B14F-4D97-AF65-F5344CB8AC3E}">
+        <p14:creationId xmlns:p14="http://schemas.microsoft.com/office/powerpoint/2010/main" val="1972032369"/>
+      </p:ext>
+    </p:extLst>
+  </p:cSld>
+  <p:clrMapOvr>
+    <a:masterClrMapping/>
+  </p:clrMapOvr>
+  <p:timing>
+    <p:tnLst>
+      <p:par>
+        <p:cTn id="1" dur="indefinite" restart="never" nodeType="tmRoot"/>
+      </p:par>
+    </p:tnLst>
+  </p:timing>
+</p:sld>
+</file>
+
+<file path=ppt/slides/slide46.xml><?xml version="1.0" encoding="utf-8"?>
+<p:sld xmlns:a="http://schemas.openxmlformats.org/drawingml/2006/main" xmlns:r="http://schemas.openxmlformats.org/officeDocument/2006/relationships" xmlns:p="http://schemas.openxmlformats.org/presentationml/2006/main">
+  <p:cSld>
+    <p:spTree>
+      <p:nvGrpSpPr>
+        <p:cNvPr id="1" name=""/>
+        <p:cNvGrpSpPr/>
+        <p:nvPr/>
+      </p:nvGrpSpPr>
+      <p:grpSpPr>
+        <a:xfrm>
+          <a:off x="0" y="0"/>
+          <a:ext cx="0" cy="0"/>
+          <a:chOff x="0" y="0"/>
+          <a:chExt cx="0" cy="0"/>
+        </a:xfrm>
+      </p:grpSpPr>
+      <p:sp>
+        <p:nvSpPr>
+          <p:cNvPr id="2" name="Title 1"/>
+          <p:cNvSpPr>
+            <a:spLocks noGrp="1"/>
+          </p:cNvSpPr>
+          <p:nvPr>
+            <p:ph type="title"/>
+          </p:nvPr>
+        </p:nvSpPr>
+        <p:spPr/>
+        <p:txBody>
+          <a:bodyPr>
+            <a:normAutofit/>
+          </a:bodyPr>
+          <a:lstStyle/>
+          <a:p>
+            <a:r>
+              <a:rPr lang="en-GB" dirty="0" smtClean="0"/>
+              <a:t>Closure Vs Lambda</a:t>
+            </a:r>
+            <a:endParaRPr lang="en-US" dirty="0"/>
+          </a:p>
+        </p:txBody>
+      </p:sp>
+      <p:graphicFrame>
+        <p:nvGraphicFramePr>
+          <p:cNvPr id="4" name="Table 3"/>
+          <p:cNvGraphicFramePr>
+            <a:graphicFrameLocks noGrp="1"/>
+          </p:cNvGraphicFramePr>
+          <p:nvPr>
+            <p:extLst>
+              <p:ext uri="{D42A27DB-BD31-4B8C-83A1-F6EECF244321}">
+                <p14:modId xmlns:p14="http://schemas.microsoft.com/office/powerpoint/2010/main" val="2660155194"/>
+              </p:ext>
+            </p:extLst>
+          </p:nvPr>
+        </p:nvGraphicFramePr>
+        <p:xfrm>
+          <a:off x="683568" y="1772816"/>
+          <a:ext cx="7416824" cy="3371840"/>
+        </p:xfrm>
+        <a:graphic>
+          <a:graphicData uri="http://schemas.openxmlformats.org/drawingml/2006/table">
+            <a:tbl>
+              <a:tblPr firstRow="1" bandRow="1">
+                <a:tableStyleId>{5C22544A-7EE6-4342-B048-85BDC9FD1C3A}</a:tableStyleId>
+              </a:tblPr>
+              <a:tblGrid>
+                <a:gridCol w="3708412"/>
+                <a:gridCol w="3708412"/>
+              </a:tblGrid>
+              <a:tr h="720080">
+                <a:tc>
+                  <a:txBody>
+                    <a:bodyPr/>
+                    <a:lstStyle/>
+                    <a:p>
+                      <a:r>
+                        <a:rPr lang="en-GB" dirty="0" smtClean="0"/>
+                        <a:t>Lambda</a:t>
+                      </a:r>
+                      <a:endParaRPr lang="en-GB" dirty="0"/>
+                    </a:p>
+                  </a:txBody>
+                  <a:tcPr>
+                    <a:lnL w="12700" cap="flat" cmpd="sng" algn="ctr">
+                      <a:solidFill>
+                        <a:schemeClr val="tx1"/>
+                      </a:solidFill>
+                      <a:prstDash val="solid"/>
+                      <a:round/>
+                      <a:headEnd type="none" w="med" len="med"/>
+                      <a:tailEnd type="none" w="med" len="med"/>
+                    </a:lnL>
+                    <a:lnR w="12700" cap="flat" cmpd="sng" algn="ctr">
+                      <a:solidFill>
+                        <a:schemeClr val="tx1"/>
+                      </a:solidFill>
+                      <a:prstDash val="solid"/>
+                      <a:round/>
+                      <a:headEnd type="none" w="med" len="med"/>
+                      <a:tailEnd type="none" w="med" len="med"/>
+                    </a:lnR>
+                    <a:lnT w="12700" cap="flat" cmpd="sng" algn="ctr">
+                      <a:solidFill>
+                        <a:schemeClr val="tx1"/>
+                      </a:solidFill>
+                      <a:prstDash val="solid"/>
+                      <a:round/>
+                      <a:headEnd type="none" w="med" len="med"/>
+                      <a:tailEnd type="none" w="med" len="med"/>
+                    </a:lnT>
+                    <a:lnB w="12700" cap="flat" cmpd="sng" algn="ctr">
+                      <a:solidFill>
+                        <a:schemeClr val="tx1"/>
+                      </a:solidFill>
+                      <a:prstDash val="solid"/>
+                      <a:round/>
+                      <a:headEnd type="none" w="med" len="med"/>
+                      <a:tailEnd type="none" w="med" len="med"/>
+                    </a:lnB>
+                  </a:tcPr>
+                </a:tc>
+                <a:tc>
+                  <a:txBody>
+                    <a:bodyPr/>
+                    <a:lstStyle/>
+                    <a:p>
+                      <a:r>
+                        <a:rPr lang="en-GB" dirty="0" smtClean="0"/>
+                        <a:t>Closure</a:t>
+                      </a:r>
+                      <a:endParaRPr lang="en-GB" dirty="0"/>
+                    </a:p>
+                  </a:txBody>
+                  <a:tcPr>
+                    <a:lnL w="12700" cap="flat" cmpd="sng" algn="ctr">
+                      <a:solidFill>
+                        <a:schemeClr val="tx1"/>
+                      </a:solidFill>
+                      <a:prstDash val="solid"/>
+                      <a:round/>
+                      <a:headEnd type="none" w="med" len="med"/>
+                      <a:tailEnd type="none" w="med" len="med"/>
+                    </a:lnL>
+                    <a:lnR w="12700" cap="flat" cmpd="sng" algn="ctr">
+                      <a:solidFill>
+                        <a:schemeClr val="tx1"/>
+                      </a:solidFill>
+                      <a:prstDash val="solid"/>
+                      <a:round/>
+                      <a:headEnd type="none" w="med" len="med"/>
+                      <a:tailEnd type="none" w="med" len="med"/>
+                    </a:lnR>
+                    <a:lnT w="12700" cap="flat" cmpd="sng" algn="ctr">
+                      <a:solidFill>
+                        <a:schemeClr val="tx1"/>
+                      </a:solidFill>
+                      <a:prstDash val="solid"/>
+                      <a:round/>
+                      <a:headEnd type="none" w="med" len="med"/>
+                      <a:tailEnd type="none" w="med" len="med"/>
+                    </a:lnT>
+                    <a:lnB w="12700" cap="flat" cmpd="sng" algn="ctr">
+                      <a:solidFill>
+                        <a:schemeClr val="tx1"/>
+                      </a:solidFill>
+                      <a:prstDash val="solid"/>
+                      <a:round/>
+                      <a:headEnd type="none" w="med" len="med"/>
+                      <a:tailEnd type="none" w="med" len="med"/>
+                    </a:lnB>
+                  </a:tcPr>
+                </a:tc>
+              </a:tr>
+              <a:tr h="648072">
+                <a:tc>
+                  <a:txBody>
+                    <a:bodyPr/>
+                    <a:lstStyle/>
+                    <a:p>
+                      <a:r>
+                        <a:rPr lang="en-GB" dirty="0" smtClean="0"/>
+                        <a:t>Anonymous Function – a function defined with no name</a:t>
+                      </a:r>
+                      <a:endParaRPr lang="en-GB" dirty="0"/>
+                    </a:p>
+                  </a:txBody>
+                  <a:tcPr>
+                    <a:lnL w="12700" cap="flat" cmpd="sng" algn="ctr">
+                      <a:solidFill>
+                        <a:schemeClr val="tx1"/>
+                      </a:solidFill>
+                      <a:prstDash val="solid"/>
+                      <a:round/>
+                      <a:headEnd type="none" w="med" len="med"/>
+                      <a:tailEnd type="none" w="med" len="med"/>
+                    </a:lnL>
+                    <a:lnR w="12700" cap="flat" cmpd="sng" algn="ctr">
+                      <a:solidFill>
+                        <a:schemeClr val="tx1"/>
+                      </a:solidFill>
+                      <a:prstDash val="solid"/>
+                      <a:round/>
+                      <a:headEnd type="none" w="med" len="med"/>
+                      <a:tailEnd type="none" w="med" len="med"/>
+                    </a:lnR>
+                    <a:lnT w="12700" cap="flat" cmpd="sng" algn="ctr">
+                      <a:solidFill>
+                        <a:schemeClr val="tx1"/>
+                      </a:solidFill>
+                      <a:prstDash val="solid"/>
+                      <a:round/>
+                      <a:headEnd type="none" w="med" len="med"/>
+                      <a:tailEnd type="none" w="med" len="med"/>
+                    </a:lnT>
+                    <a:lnB w="12700" cap="flat" cmpd="sng" algn="ctr">
+                      <a:solidFill>
+                        <a:schemeClr val="tx1"/>
+                      </a:solidFill>
+                      <a:prstDash val="solid"/>
+                      <a:round/>
+                      <a:headEnd type="none" w="med" len="med"/>
+                      <a:tailEnd type="none" w="med" len="med"/>
+                    </a:lnB>
+                  </a:tcPr>
+                </a:tc>
+                <a:tc>
+                  <a:txBody>
+                    <a:bodyPr/>
+                    <a:lstStyle/>
+                    <a:p>
+                      <a:r>
+                        <a:rPr lang="en-GB" sz="1800" b="0" i="0" kern="1200" dirty="0" smtClean="0">
+                          <a:solidFill>
+                            <a:schemeClr val="dk1"/>
+                          </a:solidFill>
+                          <a:effectLst/>
+                          <a:latin typeface="+mn-lt"/>
+                          <a:ea typeface="+mn-ea"/>
+                          <a:cs typeface="+mn-cs"/>
+                        </a:rPr>
+                        <a:t>A </a:t>
+                      </a:r>
+                      <a:r>
+                        <a:rPr lang="en-GB" sz="1800" b="1" i="1" kern="1200" dirty="0" smtClean="0">
+                          <a:solidFill>
+                            <a:schemeClr val="dk1"/>
+                          </a:solidFill>
+                          <a:effectLst/>
+                          <a:latin typeface="+mn-lt"/>
+                          <a:ea typeface="+mn-ea"/>
+                          <a:cs typeface="+mn-cs"/>
+                        </a:rPr>
+                        <a:t>closure</a:t>
+                      </a:r>
+                      <a:r>
+                        <a:rPr lang="en-GB" sz="1800" b="0" i="0" kern="1200" dirty="0" smtClean="0">
+                          <a:solidFill>
+                            <a:schemeClr val="dk1"/>
+                          </a:solidFill>
+                          <a:effectLst/>
+                          <a:latin typeface="+mn-lt"/>
+                          <a:ea typeface="+mn-ea"/>
+                          <a:cs typeface="+mn-cs"/>
+                        </a:rPr>
+                        <a:t> is a function that is evaluated in its own environment, which has one or more bound variables that can be accessed when the function is called</a:t>
+                      </a:r>
+                      <a:endParaRPr lang="en-GB" dirty="0"/>
+                    </a:p>
+                  </a:txBody>
+                  <a:tcPr>
+                    <a:lnL w="12700" cap="flat" cmpd="sng" algn="ctr">
+                      <a:solidFill>
+                        <a:schemeClr val="tx1"/>
+                      </a:solidFill>
+                      <a:prstDash val="solid"/>
+                      <a:round/>
+                      <a:headEnd type="none" w="med" len="med"/>
+                      <a:tailEnd type="none" w="med" len="med"/>
+                    </a:lnL>
+                    <a:lnR w="12700" cap="flat" cmpd="sng" algn="ctr">
+                      <a:solidFill>
+                        <a:schemeClr val="tx1"/>
+                      </a:solidFill>
+                      <a:prstDash val="solid"/>
+                      <a:round/>
+                      <a:headEnd type="none" w="med" len="med"/>
+                      <a:tailEnd type="none" w="med" len="med"/>
+                    </a:lnR>
+                    <a:lnT w="12700" cap="flat" cmpd="sng" algn="ctr">
+                      <a:solidFill>
+                        <a:schemeClr val="tx1"/>
+                      </a:solidFill>
+                      <a:prstDash val="solid"/>
+                      <a:round/>
+                      <a:headEnd type="none" w="med" len="med"/>
+                      <a:tailEnd type="none" w="med" len="med"/>
+                    </a:lnT>
+                    <a:lnB w="12700" cap="flat" cmpd="sng" algn="ctr">
+                      <a:solidFill>
+                        <a:schemeClr val="tx1"/>
+                      </a:solidFill>
+                      <a:prstDash val="solid"/>
+                      <a:round/>
+                      <a:headEnd type="none" w="med" len="med"/>
+                      <a:tailEnd type="none" w="med" len="med"/>
+                    </a:lnB>
+                  </a:tcPr>
+                </a:tc>
+              </a:tr>
+              <a:tr h="648072">
+                <a:tc>
+                  <a:txBody>
+                    <a:bodyPr/>
+                    <a:lstStyle/>
+                    <a:p>
+                      <a:endParaRPr lang="en-GB" dirty="0"/>
+                    </a:p>
+                  </a:txBody>
+                  <a:tcPr>
+                    <a:lnL w="12700" cap="flat" cmpd="sng" algn="ctr">
+                      <a:solidFill>
+                        <a:schemeClr val="tx1"/>
+                      </a:solidFill>
+                      <a:prstDash val="solid"/>
+                      <a:round/>
+                      <a:headEnd type="none" w="med" len="med"/>
+                      <a:tailEnd type="none" w="med" len="med"/>
+                    </a:lnL>
+                    <a:lnR w="12700" cap="flat" cmpd="sng" algn="ctr">
+                      <a:solidFill>
+                        <a:schemeClr val="tx1"/>
+                      </a:solidFill>
+                      <a:prstDash val="solid"/>
+                      <a:round/>
+                      <a:headEnd type="none" w="med" len="med"/>
+                      <a:tailEnd type="none" w="med" len="med"/>
+                    </a:lnR>
+                    <a:lnT w="12700" cap="flat" cmpd="sng" algn="ctr">
+                      <a:solidFill>
+                        <a:schemeClr val="tx1"/>
+                      </a:solidFill>
+                      <a:prstDash val="solid"/>
+                      <a:round/>
+                      <a:headEnd type="none" w="med" len="med"/>
+                      <a:tailEnd type="none" w="med" len="med"/>
+                    </a:lnT>
+                    <a:lnB w="12700" cap="flat" cmpd="sng" algn="ctr">
+                      <a:solidFill>
+                        <a:schemeClr val="tx1"/>
+                      </a:solidFill>
+                      <a:prstDash val="solid"/>
+                      <a:round/>
+                      <a:headEnd type="none" w="med" len="med"/>
+                      <a:tailEnd type="none" w="med" len="med"/>
+                    </a:lnB>
+                  </a:tcPr>
+                </a:tc>
+                <a:tc>
+                  <a:txBody>
+                    <a:bodyPr/>
+                    <a:lstStyle/>
+                    <a:p>
+                      <a:r>
+                        <a:rPr lang="en-GB" sz="1800" b="0" i="0" kern="1200" dirty="0" smtClean="0">
+                          <a:solidFill>
+                            <a:schemeClr val="dk1"/>
+                          </a:solidFill>
+                          <a:effectLst/>
+                          <a:latin typeface="+mn-lt"/>
+                          <a:ea typeface="+mn-ea"/>
+                          <a:cs typeface="+mn-cs"/>
+                        </a:rPr>
+                        <a:t>Have the ability to interact with variables from the </a:t>
+                      </a:r>
+                      <a:r>
+                        <a:rPr lang="en-GB" sz="1800" b="0" i="0" kern="1200" dirty="0" smtClean="0">
+                          <a:solidFill>
+                            <a:srgbClr val="FF0000"/>
+                          </a:solidFill>
+                          <a:effectLst/>
+                          <a:latin typeface="+mn-lt"/>
+                          <a:ea typeface="+mn-ea"/>
+                          <a:cs typeface="+mn-cs"/>
+                        </a:rPr>
+                        <a:t>outside environment</a:t>
+                      </a:r>
+                      <a:r>
+                        <a:rPr lang="en-GB" sz="1800" b="0" i="0" kern="1200" dirty="0" smtClean="0">
+                          <a:solidFill>
+                            <a:schemeClr val="dk1"/>
+                          </a:solidFill>
+                          <a:effectLst/>
+                          <a:latin typeface="+mn-lt"/>
+                          <a:ea typeface="+mn-ea"/>
+                          <a:cs typeface="+mn-cs"/>
+                        </a:rPr>
+                        <a:t> of where the closure is defined</a:t>
+                      </a:r>
+                      <a:endParaRPr lang="en-GB" dirty="0"/>
+                    </a:p>
+                  </a:txBody>
+                  <a:tcPr>
+                    <a:lnL w="12700" cap="flat" cmpd="sng" algn="ctr">
+                      <a:solidFill>
+                        <a:schemeClr val="tx1"/>
+                      </a:solidFill>
+                      <a:prstDash val="solid"/>
+                      <a:round/>
+                      <a:headEnd type="none" w="med" len="med"/>
+                      <a:tailEnd type="none" w="med" len="med"/>
+                    </a:lnL>
+                    <a:lnR w="12700" cap="flat" cmpd="sng" algn="ctr">
+                      <a:solidFill>
+                        <a:schemeClr val="tx1"/>
+                      </a:solidFill>
+                      <a:prstDash val="solid"/>
+                      <a:round/>
+                      <a:headEnd type="none" w="med" len="med"/>
+                      <a:tailEnd type="none" w="med" len="med"/>
+                    </a:lnR>
+                    <a:lnT w="12700" cap="flat" cmpd="sng" algn="ctr">
+                      <a:solidFill>
+                        <a:schemeClr val="tx1"/>
+                      </a:solidFill>
+                      <a:prstDash val="solid"/>
+                      <a:round/>
+                      <a:headEnd type="none" w="med" len="med"/>
+                      <a:tailEnd type="none" w="med" len="med"/>
+                    </a:lnT>
+                    <a:lnB w="12700" cap="flat" cmpd="sng" algn="ctr">
+                      <a:solidFill>
+                        <a:schemeClr val="tx1"/>
+                      </a:solidFill>
+                      <a:prstDash val="solid"/>
+                      <a:round/>
+                      <a:headEnd type="none" w="med" len="med"/>
+                      <a:tailEnd type="none" w="med" len="med"/>
+                    </a:lnB>
+                  </a:tcPr>
+                </a:tc>
+              </a:tr>
+            </a:tbl>
+          </a:graphicData>
+        </a:graphic>
+      </p:graphicFrame>
+    </p:spTree>
+    <p:extLst>
+      <p:ext uri="{BB962C8B-B14F-4D97-AF65-F5344CB8AC3E}">
+        <p14:creationId xmlns:p14="http://schemas.microsoft.com/office/powerpoint/2010/main" val="2439759227"/>
+      </p:ext>
+    </p:extLst>
+  </p:cSld>
+  <p:clrMapOvr>
+    <a:masterClrMapping/>
+  </p:clrMapOvr>
+  <p:timing>
+    <p:tnLst>
+      <p:par>
+        <p:cTn id="1" dur="indefinite" restart="never" nodeType="tmRoot"/>
+      </p:par>
+    </p:tnLst>
+  </p:timing>
+</p:sld>
+</file>
+
+<file path=ppt/slides/slide47.xml><?xml version="1.0" encoding="utf-8"?>
+<p:sld xmlns:a="http://schemas.openxmlformats.org/drawingml/2006/main" xmlns:r="http://schemas.openxmlformats.org/officeDocument/2006/relationships" xmlns:p="http://schemas.openxmlformats.org/presentationml/2006/main">
+  <p:cSld>
+    <p:spTree>
+      <p:nvGrpSpPr>
+        <p:cNvPr id="1" name=""/>
+        <p:cNvGrpSpPr/>
+        <p:nvPr/>
+      </p:nvGrpSpPr>
+      <p:grpSpPr>
+        <a:xfrm>
+          <a:off x="0" y="0"/>
+          <a:ext cx="0" cy="0"/>
+          <a:chOff x="0" y="0"/>
+          <a:chExt cx="0" cy="0"/>
+        </a:xfrm>
+      </p:grpSpPr>
+      <p:sp>
+        <p:nvSpPr>
+          <p:cNvPr id="2" name="Title 1"/>
+          <p:cNvSpPr>
+            <a:spLocks noGrp="1"/>
+          </p:cNvSpPr>
+          <p:nvPr>
+            <p:ph type="title"/>
+          </p:nvPr>
+        </p:nvSpPr>
+        <p:spPr/>
+        <p:txBody>
           <a:bodyPr/>
           <a:lstStyle/>
           <a:p>
@@ -9866,7 +10753,7 @@
 </p:sld>
 </file>
 
-<file path=ppt/slides/slide45.xml><?xml version="1.0" encoding="utf-8"?>
+<file path=ppt/slides/slide48.xml><?xml version="1.0" encoding="utf-8"?>
 <p:sld xmlns:a="http://schemas.openxmlformats.org/drawingml/2006/main" xmlns:r="http://schemas.openxmlformats.org/officeDocument/2006/relationships" xmlns:p="http://schemas.openxmlformats.org/presentationml/2006/main">
   <p:cSld>
     <p:spTree>

</xml_diff>